<commit_message>
Callers-to-codes - 6/12/20 Update
</commit_message>
<xml_diff>
--- a/Lectures/(3) Extracting & Storing Data.pptx
+++ b/Lectures/(3) Extracting & Storing Data.pptx
@@ -5,7 +5,7 @@
     <p:sldMasterId id="2147483672" r:id="rId1"/>
   </p:sldMasterIdLst>
   <p:notesMasterIdLst>
-    <p:notesMasterId r:id="rId14"/>
+    <p:notesMasterId r:id="rId16"/>
   </p:notesMasterIdLst>
   <p:sldIdLst>
     <p:sldId id="256" r:id="rId2"/>
@@ -20,37 +20,39 @@
     <p:sldId id="267" r:id="rId11"/>
     <p:sldId id="268" r:id="rId12"/>
     <p:sldId id="269" r:id="rId13"/>
+    <p:sldId id="271" r:id="rId14"/>
+    <p:sldId id="272" r:id="rId15"/>
   </p:sldIdLst>
   <p:sldSz cx="12192000" cy="6858000"/>
   <p:notesSz cx="6858000" cy="9144000"/>
   <p:embeddedFontLst>
     <p:embeddedFont>
       <p:font typeface="Calibri" panose="020F0502020204030204" pitchFamily="34" charset="0"/>
-      <p:regular r:id="rId15"/>
-      <p:bold r:id="rId16"/>
-      <p:italic r:id="rId17"/>
-      <p:boldItalic r:id="rId18"/>
+      <p:regular r:id="rId17"/>
+      <p:bold r:id="rId18"/>
+      <p:italic r:id="rId19"/>
+      <p:boldItalic r:id="rId20"/>
     </p:embeddedFont>
     <p:embeddedFont>
       <p:font typeface="Lato" panose="020B0604020202020204" charset="0"/>
-      <p:regular r:id="rId19"/>
-      <p:bold r:id="rId20"/>
-      <p:italic r:id="rId21"/>
-      <p:boldItalic r:id="rId22"/>
+      <p:regular r:id="rId21"/>
+      <p:bold r:id="rId22"/>
+      <p:italic r:id="rId23"/>
+      <p:boldItalic r:id="rId24"/>
     </p:embeddedFont>
     <p:embeddedFont>
       <p:font typeface="Raleway" panose="020B0604020202020204" charset="0"/>
-      <p:regular r:id="rId23"/>
-      <p:bold r:id="rId24"/>
-      <p:italic r:id="rId25"/>
-      <p:boldItalic r:id="rId26"/>
+      <p:regular r:id="rId25"/>
+      <p:bold r:id="rId26"/>
+      <p:italic r:id="rId27"/>
+      <p:boldItalic r:id="rId28"/>
     </p:embeddedFont>
     <p:embeddedFont>
       <p:font typeface="Verdana" panose="020B0604030504040204" pitchFamily="34" charset="0"/>
-      <p:regular r:id="rId27"/>
-      <p:bold r:id="rId28"/>
-      <p:italic r:id="rId29"/>
-      <p:boldItalic r:id="rId30"/>
+      <p:regular r:id="rId29"/>
+      <p:bold r:id="rId30"/>
+      <p:italic r:id="rId31"/>
+      <p:boldItalic r:id="rId32"/>
     </p:embeddedFont>
   </p:embeddedFontLst>
   <p:defaultTextStyle>
@@ -2359,7 +2361,7 @@
                   <a:srgbClr val="000000"/>
                 </a:solidFill>
               </a:rPr>
-              <a:t> = 'Asia’)</a:t>
+              <a:t> = 'Asia’); </a:t>
             </a:r>
           </a:p>
           <a:p>
@@ -2394,7 +2396,7 @@
                   <a:srgbClr val="000000"/>
                 </a:solidFill>
               </a:rPr>
-              <a:t> SELECT  country  FROM </a:t>
+              <a:t>;SELECT  country  FROM </a:t>
             </a:r>
             <a:r>
               <a:rPr lang="en-US" dirty="0" err="1">
@@ -2410,7 +2412,7 @@
                   <a:srgbClr val="000000"/>
                 </a:solidFill>
               </a:rPr>
-              <a:t>  WHERE  Country IN ('India', 'China', 'Nepal')</a:t>
+              <a:t>  WHERE  Country IN ('India', 'China', 'Nepal');</a:t>
             </a:r>
             <a:endParaRPr dirty="0">
               <a:solidFill>
@@ -2690,6 +2692,316 @@
 </p:notes>
 </file>
 
+<file path=ppt/notesSlides/notesSlide13.xml><?xml version="1.0" encoding="utf-8"?>
+<p:notes xmlns:a="http://schemas.openxmlformats.org/drawingml/2006/main" xmlns:r="http://schemas.openxmlformats.org/officeDocument/2006/relationships" xmlns:p="http://schemas.openxmlformats.org/presentationml/2006/main" showMasterSp="0" showMasterPhAnim="0">
+  <p:cSld>
+    <p:spTree>
+      <p:nvGrpSpPr>
+        <p:cNvPr id="1" name="Shape 277"/>
+        <p:cNvGrpSpPr/>
+        <p:nvPr/>
+      </p:nvGrpSpPr>
+      <p:grpSpPr>
+        <a:xfrm>
+          <a:off x="0" y="0"/>
+          <a:ext cx="0" cy="0"/>
+          <a:chOff x="0" y="0"/>
+          <a:chExt cx="0" cy="0"/>
+        </a:xfrm>
+      </p:grpSpPr>
+      <p:sp>
+        <p:nvSpPr>
+          <p:cNvPr id="278" name="Google Shape;278;g509d03fa30_2_6:notes"/>
+          <p:cNvSpPr>
+            <a:spLocks noGrp="1" noRot="1" noChangeAspect="1"/>
+          </p:cNvSpPr>
+          <p:nvPr>
+            <p:ph type="sldImg" idx="2"/>
+          </p:nvPr>
+        </p:nvSpPr>
+        <p:spPr>
+          <a:xfrm>
+            <a:off x="685800" y="1143000"/>
+            <a:ext cx="5486400" cy="3086100"/>
+          </a:xfrm>
+          <a:custGeom>
+            <a:avLst/>
+            <a:gdLst/>
+            <a:ahLst/>
+            <a:cxnLst/>
+            <a:rect l="l" t="t" r="r" b="b"/>
+            <a:pathLst>
+              <a:path w="120000" h="120000" extrusionOk="0">
+                <a:moveTo>
+                  <a:pt x="0" y="0"/>
+                </a:moveTo>
+                <a:lnTo>
+                  <a:pt x="120000" y="0"/>
+                </a:lnTo>
+                <a:lnTo>
+                  <a:pt x="120000" y="120000"/>
+                </a:lnTo>
+                <a:lnTo>
+                  <a:pt x="0" y="120000"/>
+                </a:lnTo>
+                <a:close/>
+              </a:path>
+            </a:pathLst>
+          </a:custGeom>
+        </p:spPr>
+      </p:sp>
+      <p:sp>
+        <p:nvSpPr>
+          <p:cNvPr id="279" name="Google Shape;279;g509d03fa30_2_6:notes"/>
+          <p:cNvSpPr txBox="1">
+            <a:spLocks noGrp="1"/>
+          </p:cNvSpPr>
+          <p:nvPr>
+            <p:ph type="body" idx="1"/>
+          </p:nvPr>
+        </p:nvSpPr>
+        <p:spPr>
+          <a:xfrm>
+            <a:off x="685800" y="4400550"/>
+            <a:ext cx="5486400" cy="3600600"/>
+          </a:xfrm>
+          <a:prstGeom prst="rect">
+            <a:avLst/>
+          </a:prstGeom>
+        </p:spPr>
+        <p:txBody>
+          <a:bodyPr spcFirstLastPara="1" wrap="square" lIns="91425" tIns="45700" rIns="91425" bIns="45700" anchor="t" anchorCtr="0">
+            <a:noAutofit/>
+          </a:bodyPr>
+          <a:lstStyle/>
+          <a:p>
+            <a:pPr marL="0" lvl="0" indent="0" algn="l" rtl="0">
+              <a:spcBef>
+                <a:spcPts val="1100"/>
+              </a:spcBef>
+              <a:spcAft>
+                <a:spcPts val="0"/>
+              </a:spcAft>
+              <a:buNone/>
+            </a:pPr>
+            <a:endParaRPr dirty="0"/>
+          </a:p>
+        </p:txBody>
+      </p:sp>
+      <p:sp>
+        <p:nvSpPr>
+          <p:cNvPr id="280" name="Google Shape;280;g509d03fa30_2_6:notes"/>
+          <p:cNvSpPr txBox="1">
+            <a:spLocks noGrp="1"/>
+          </p:cNvSpPr>
+          <p:nvPr>
+            <p:ph type="sldNum" idx="12"/>
+          </p:nvPr>
+        </p:nvSpPr>
+        <p:spPr>
+          <a:xfrm>
+            <a:off x="3884613" y="8685213"/>
+            <a:ext cx="2971800" cy="458700"/>
+          </a:xfrm>
+          <a:prstGeom prst="rect">
+            <a:avLst/>
+          </a:prstGeom>
+        </p:spPr>
+        <p:txBody>
+          <a:bodyPr spcFirstLastPara="1" wrap="square" lIns="91425" tIns="45700" rIns="91425" bIns="45700" anchor="b" anchorCtr="0">
+            <a:noAutofit/>
+          </a:bodyPr>
+          <a:lstStyle/>
+          <a:p>
+            <a:pPr marL="0" lvl="0" indent="0" algn="r" rtl="0">
+              <a:spcBef>
+                <a:spcPts val="0"/>
+              </a:spcBef>
+              <a:spcAft>
+                <a:spcPts val="0"/>
+              </a:spcAft>
+              <a:buClr>
+                <a:srgbClr val="000000"/>
+              </a:buClr>
+              <a:buFont typeface="Arial"/>
+              <a:buNone/>
+            </a:pPr>
+            <a:fld id="{00000000-1234-1234-1234-123412341234}" type="slidenum">
+              <a:rPr lang="en-US"/>
+              <a:t>13</a:t>
+            </a:fld>
+            <a:endParaRPr/>
+          </a:p>
+        </p:txBody>
+      </p:sp>
+    </p:spTree>
+    <p:extLst>
+      <p:ext uri="{BB962C8B-B14F-4D97-AF65-F5344CB8AC3E}">
+        <p14:creationId xmlns:p14="http://schemas.microsoft.com/office/powerpoint/2010/main" val="1498149205"/>
+      </p:ext>
+    </p:extLst>
+  </p:cSld>
+  <p:clrMapOvr>
+    <a:masterClrMapping/>
+  </p:clrMapOvr>
+</p:notes>
+</file>
+
+<file path=ppt/notesSlides/notesSlide14.xml><?xml version="1.0" encoding="utf-8"?>
+<p:notes xmlns:a="http://schemas.openxmlformats.org/drawingml/2006/main" xmlns:r="http://schemas.openxmlformats.org/officeDocument/2006/relationships" xmlns:p="http://schemas.openxmlformats.org/presentationml/2006/main" showMasterSp="0" showMasterPhAnim="0">
+  <p:cSld>
+    <p:spTree>
+      <p:nvGrpSpPr>
+        <p:cNvPr id="1" name="Shape 277"/>
+        <p:cNvGrpSpPr/>
+        <p:nvPr/>
+      </p:nvGrpSpPr>
+      <p:grpSpPr>
+        <a:xfrm>
+          <a:off x="0" y="0"/>
+          <a:ext cx="0" cy="0"/>
+          <a:chOff x="0" y="0"/>
+          <a:chExt cx="0" cy="0"/>
+        </a:xfrm>
+      </p:grpSpPr>
+      <p:sp>
+        <p:nvSpPr>
+          <p:cNvPr id="278" name="Google Shape;278;g509d03fa30_2_6:notes"/>
+          <p:cNvSpPr>
+            <a:spLocks noGrp="1" noRot="1" noChangeAspect="1"/>
+          </p:cNvSpPr>
+          <p:nvPr>
+            <p:ph type="sldImg" idx="2"/>
+          </p:nvPr>
+        </p:nvSpPr>
+        <p:spPr>
+          <a:xfrm>
+            <a:off x="685800" y="1143000"/>
+            <a:ext cx="5486400" cy="3086100"/>
+          </a:xfrm>
+          <a:custGeom>
+            <a:avLst/>
+            <a:gdLst/>
+            <a:ahLst/>
+            <a:cxnLst/>
+            <a:rect l="l" t="t" r="r" b="b"/>
+            <a:pathLst>
+              <a:path w="120000" h="120000" extrusionOk="0">
+                <a:moveTo>
+                  <a:pt x="0" y="0"/>
+                </a:moveTo>
+                <a:lnTo>
+                  <a:pt x="120000" y="0"/>
+                </a:lnTo>
+                <a:lnTo>
+                  <a:pt x="120000" y="120000"/>
+                </a:lnTo>
+                <a:lnTo>
+                  <a:pt x="0" y="120000"/>
+                </a:lnTo>
+                <a:close/>
+              </a:path>
+            </a:pathLst>
+          </a:custGeom>
+        </p:spPr>
+      </p:sp>
+      <p:sp>
+        <p:nvSpPr>
+          <p:cNvPr id="279" name="Google Shape;279;g509d03fa30_2_6:notes"/>
+          <p:cNvSpPr txBox="1">
+            <a:spLocks noGrp="1"/>
+          </p:cNvSpPr>
+          <p:nvPr>
+            <p:ph type="body" idx="1"/>
+          </p:nvPr>
+        </p:nvSpPr>
+        <p:spPr>
+          <a:xfrm>
+            <a:off x="685800" y="4400550"/>
+            <a:ext cx="5486400" cy="3600600"/>
+          </a:xfrm>
+          <a:prstGeom prst="rect">
+            <a:avLst/>
+          </a:prstGeom>
+        </p:spPr>
+        <p:txBody>
+          <a:bodyPr spcFirstLastPara="1" wrap="square" lIns="91425" tIns="45700" rIns="91425" bIns="45700" anchor="t" anchorCtr="0">
+            <a:noAutofit/>
+          </a:bodyPr>
+          <a:lstStyle/>
+          <a:p>
+            <a:pPr marL="0" lvl="0" indent="0" algn="l" rtl="0">
+              <a:spcBef>
+                <a:spcPts val="1100"/>
+              </a:spcBef>
+              <a:spcAft>
+                <a:spcPts val="0"/>
+              </a:spcAft>
+              <a:buNone/>
+            </a:pPr>
+            <a:endParaRPr dirty="0"/>
+          </a:p>
+        </p:txBody>
+      </p:sp>
+      <p:sp>
+        <p:nvSpPr>
+          <p:cNvPr id="280" name="Google Shape;280;g509d03fa30_2_6:notes"/>
+          <p:cNvSpPr txBox="1">
+            <a:spLocks noGrp="1"/>
+          </p:cNvSpPr>
+          <p:nvPr>
+            <p:ph type="sldNum" idx="12"/>
+          </p:nvPr>
+        </p:nvSpPr>
+        <p:spPr>
+          <a:xfrm>
+            <a:off x="3884613" y="8685213"/>
+            <a:ext cx="2971800" cy="458700"/>
+          </a:xfrm>
+          <a:prstGeom prst="rect">
+            <a:avLst/>
+          </a:prstGeom>
+        </p:spPr>
+        <p:txBody>
+          <a:bodyPr spcFirstLastPara="1" wrap="square" lIns="91425" tIns="45700" rIns="91425" bIns="45700" anchor="b" anchorCtr="0">
+            <a:noAutofit/>
+          </a:bodyPr>
+          <a:lstStyle/>
+          <a:p>
+            <a:pPr marL="0" lvl="0" indent="0" algn="r" rtl="0">
+              <a:spcBef>
+                <a:spcPts val="0"/>
+              </a:spcBef>
+              <a:spcAft>
+                <a:spcPts val="0"/>
+              </a:spcAft>
+              <a:buClr>
+                <a:srgbClr val="000000"/>
+              </a:buClr>
+              <a:buFont typeface="Arial"/>
+              <a:buNone/>
+            </a:pPr>
+            <a:fld id="{00000000-1234-1234-1234-123412341234}" type="slidenum">
+              <a:rPr lang="en-US"/>
+              <a:t>14</a:t>
+            </a:fld>
+            <a:endParaRPr/>
+          </a:p>
+        </p:txBody>
+      </p:sp>
+    </p:spTree>
+    <p:extLst>
+      <p:ext uri="{BB962C8B-B14F-4D97-AF65-F5344CB8AC3E}">
+        <p14:creationId xmlns:p14="http://schemas.microsoft.com/office/powerpoint/2010/main" val="3271899087"/>
+      </p:ext>
+    </p:extLst>
+  </p:cSld>
+  <p:clrMapOvr>
+    <a:masterClrMapping/>
+  </p:clrMapOvr>
+</p:notes>
+</file>
+
 <file path=ppt/notesSlides/notesSlide2.xml><?xml version="1.0" encoding="utf-8"?>
 <p:notes xmlns:a="http://schemas.openxmlformats.org/drawingml/2006/main" xmlns:r="http://schemas.openxmlformats.org/officeDocument/2006/relationships" xmlns:p="http://schemas.openxmlformats.org/presentationml/2006/main" showMasterSp="0" showMasterPhAnim="0">
   <p:cSld>
@@ -3688,7 +4000,7 @@
                 <a:cs typeface="Lato"/>
                 <a:sym typeface="Lato"/>
               </a:rPr>
-              <a:t>use </a:t>
+              <a:t>USE </a:t>
             </a:r>
             <a:r>
               <a:rPr lang="en-US" b="1" dirty="0" err="1">
@@ -3761,7 +4073,7 @@
                 <a:cs typeface="Lato"/>
                 <a:sym typeface="Lato"/>
               </a:rPr>
-              <a:t> INT(11) NOT NULL,	</a:t>
+              <a:t> INT NOT NULL UNIQUE,	</a:t>
             </a:r>
           </a:p>
           <a:p>
@@ -3903,7 +4215,7 @@
                 <a:cs typeface="Lato"/>
                 <a:sym typeface="Lato"/>
               </a:rPr>
-              <a:t>addressline1 VARCHAR(50) NOT NULL,    </a:t>
+              <a:t>addressline1 VARCHAR(50) NOT NULL,   </a:t>
             </a:r>
           </a:p>
           <a:p>
@@ -3926,7 +4238,7 @@
                 <a:cs typeface="Lato"/>
                 <a:sym typeface="Lato"/>
               </a:rPr>
-              <a:t>addressline2 VARCHAR(50) DEFAULT NULL,    </a:t>
+              <a:t> addressline2 VARCHAR(50) DEFAULT NULL,    </a:t>
             </a:r>
           </a:p>
           <a:p>
@@ -3972,7 +4284,7 @@
                 <a:cs typeface="Lato"/>
                 <a:sym typeface="Lato"/>
               </a:rPr>
-              <a:t>state VARCHAR(50) DEFAULT NULL,    </a:t>
+              <a:t>state CHAR(2) DEFAULT NULL,    </a:t>
             </a:r>
           </a:p>
           <a:p>
@@ -4027,7 +4339,7 @@
                 <a:cs typeface="Lato"/>
                 <a:sym typeface="Lato"/>
               </a:rPr>
-              <a:t>country VARCHAR(50) NOT NULL,    </a:t>
+              <a:t>country CHAR(3) NOT NULL DEFAULT 'USA',    </a:t>
             </a:r>
           </a:p>
           <a:p>
@@ -4059,7 +4371,7 @@
                 <a:cs typeface="Lato"/>
                 <a:sym typeface="Lato"/>
               </a:rPr>
-              <a:t> INT(11) DEFAULT NULL,    </a:t>
+              <a:t> INT DEFAULT NULL,    </a:t>
             </a:r>
           </a:p>
           <a:p>
@@ -4091,7 +4403,25 @@
                 <a:cs typeface="Lato"/>
                 <a:sym typeface="Lato"/>
               </a:rPr>
-              <a:t> DECIMAL(10,2) DEFAULT NULL,    </a:t>
+              <a:t> DECIMAL(10,2) CHECK (</a:t>
+            </a:r>
+            <a:r>
+              <a:rPr lang="en-US" b="1" dirty="0" err="1">
+                <a:latin typeface="Lato"/>
+                <a:ea typeface="Lato"/>
+                <a:cs typeface="Lato"/>
+                <a:sym typeface="Lato"/>
+              </a:rPr>
+              <a:t>creditlimit</a:t>
+            </a:r>
+            <a:r>
+              <a:rPr lang="en-US" b="1" dirty="0">
+                <a:latin typeface="Lato"/>
+                <a:ea typeface="Lato"/>
+                <a:cs typeface="Lato"/>
+                <a:sym typeface="Lato"/>
+              </a:rPr>
+              <a:t> &lt; 1000000),   </a:t>
             </a:r>
           </a:p>
           <a:p>
@@ -4114,7 +4444,7 @@
                 <a:cs typeface="Lato"/>
                 <a:sym typeface="Lato"/>
               </a:rPr>
-              <a:t>PRIMARY KEY (</a:t>
+              <a:t> PRIMARY KEY (</a:t>
             </a:r>
             <a:r>
               <a:rPr lang="en-US" b="1" dirty="0" err="1">
@@ -4132,12 +4462,46 @@
                 <a:cs typeface="Lato"/>
                 <a:sym typeface="Lato"/>
               </a:rPr>
-              <a:t>));</a:t>
-            </a:r>
+              <a:t>)</a:t>
+            </a:r>
+          </a:p>
+          <a:p>
+            <a:pPr marL="457200" lvl="0" indent="0" algn="l" rtl="0">
+              <a:lnSpc>
+                <a:spcPct val="115000"/>
+              </a:lnSpc>
+              <a:spcBef>
+                <a:spcPts val="0"/>
+              </a:spcBef>
+              <a:spcAft>
+                <a:spcPts val="0"/>
+              </a:spcAft>
+              <a:buNone/>
+            </a:pPr>
+            <a:r>
+              <a:rPr lang="en-US" b="1" dirty="0">
+                <a:latin typeface="Lato"/>
+                <a:ea typeface="Lato"/>
+                <a:cs typeface="Lato"/>
+                <a:sym typeface="Lato"/>
+              </a:rPr>
+              <a:t>);</a:t>
+            </a:r>
+          </a:p>
+          <a:p>
+            <a:pPr marL="457200" lvl="0" indent="0" algn="l" rtl="0">
+              <a:lnSpc>
+                <a:spcPct val="115000"/>
+              </a:lnSpc>
+              <a:spcBef>
+                <a:spcPts val="0"/>
+              </a:spcBef>
+              <a:spcAft>
+                <a:spcPts val="0"/>
+              </a:spcAft>
+              <a:buNone/>
+            </a:pPr>
             <a:endParaRPr lang="en-US" b="1" dirty="0">
-              <a:solidFill>
-                <a:srgbClr val="FF9900"/>
-              </a:solidFill>
               <a:latin typeface="Lato"/>
               <a:ea typeface="Lato"/>
               <a:cs typeface="Lato"/>
@@ -4157,15 +4521,15 @@
               </a:spcAft>
               <a:buNone/>
             </a:pPr>
-            <a:endParaRPr lang="en-US" b="1" dirty="0">
-              <a:solidFill>
-                <a:srgbClr val="FF9900"/>
-              </a:solidFill>
-              <a:latin typeface="Lato"/>
-              <a:ea typeface="Lato"/>
-              <a:cs typeface="Lato"/>
-              <a:sym typeface="Lato"/>
-            </a:endParaRPr>
+            <a:r>
+              <a:rPr lang="en-US" b="1" dirty="0">
+                <a:latin typeface="Lato"/>
+                <a:ea typeface="Lato"/>
+                <a:cs typeface="Lato"/>
+                <a:sym typeface="Lato"/>
+              </a:rPr>
+              <a:t>/* Constraints are the rules enforced on the data columns of a table.</a:t>
+            </a:r>
           </a:p>
           <a:p>
             <a:pPr marL="457200" lvl="0" indent="0" algn="l" rtl="0">
@@ -4181,89 +4545,13 @@
               <a:buNone/>
             </a:pPr>
             <a:r>
-              <a:rPr lang="en-US" sz="1200" b="1" i="0" u="none" strike="noStrike" cap="none" dirty="0" err="1">
-                <a:solidFill>
-                  <a:schemeClr val="dk1"/>
-                </a:solidFill>
-                <a:effectLst/>
-                <a:latin typeface="Calibri"/>
-                <a:ea typeface="Calibri"/>
-                <a:cs typeface="Calibri"/>
-                <a:sym typeface="Calibri"/>
-              </a:rPr>
-              <a:t>ConstraINTs</a:t>
-            </a:r>
-            <a:r>
-              <a:rPr lang="en-US" sz="1200" b="0" i="0" u="none" strike="noStrike" cap="none" dirty="0">
-                <a:solidFill>
-                  <a:schemeClr val="dk1"/>
-                </a:solidFill>
-                <a:effectLst/>
-                <a:latin typeface="Calibri"/>
-                <a:ea typeface="Calibri"/>
-                <a:cs typeface="Calibri"/>
-                <a:sym typeface="Calibri"/>
-              </a:rPr>
-              <a:t> are the rules enforced on the data columns of a table. –</a:t>
-            </a:r>
-          </a:p>
-          <a:p>
-            <a:pPr marL="457200" lvl="0" indent="0" algn="l" rtl="0">
-              <a:lnSpc>
-                <a:spcPct val="115000"/>
-              </a:lnSpc>
-              <a:spcBef>
-                <a:spcPts val="0"/>
-              </a:spcBef>
-              <a:spcAft>
-                <a:spcPts val="0"/>
-              </a:spcAft>
-              <a:buNone/>
-            </a:pPr>
-            <a:r>
-              <a:rPr lang="en-US" sz="1200" b="0" i="0" u="none" strike="noStrike" cap="none" dirty="0">
-                <a:solidFill>
-                  <a:schemeClr val="dk1"/>
-                </a:solidFill>
-                <a:effectLst/>
-                <a:latin typeface="Calibri"/>
-                <a:ea typeface="Lato"/>
-                <a:cs typeface="Calibri"/>
-                <a:sym typeface="Calibri"/>
-              </a:rPr>
-              <a:t>Types of </a:t>
-            </a:r>
-            <a:r>
-              <a:rPr lang="en-US" sz="1200" b="0" i="0" u="none" strike="noStrike" cap="none" dirty="0" err="1">
-                <a:solidFill>
-                  <a:schemeClr val="dk1"/>
-                </a:solidFill>
-                <a:effectLst/>
-                <a:latin typeface="Calibri"/>
-                <a:ea typeface="Lato"/>
-                <a:cs typeface="Calibri"/>
-                <a:sym typeface="Calibri"/>
-              </a:rPr>
-              <a:t>ConstraINTs</a:t>
-            </a:r>
-            <a:r>
-              <a:rPr lang="en-US" sz="1200" b="0" i="0" u="none" strike="noStrike" cap="none" dirty="0">
-                <a:solidFill>
-                  <a:schemeClr val="dk1"/>
-                </a:solidFill>
-                <a:effectLst/>
-                <a:latin typeface="Calibri"/>
-                <a:ea typeface="Lato"/>
-                <a:cs typeface="Calibri"/>
-                <a:sym typeface="Calibri"/>
-              </a:rPr>
-              <a:t>:  </a:t>
-            </a:r>
-            <a:r>
-              <a:rPr lang="en-US" dirty="0">
-                <a:hlinkClick r:id="rId3"/>
-              </a:rPr>
-              <a:t>https://www.tutorialspoINT.com/sql/sql-constraINTs.htm</a:t>
+              <a:rPr lang="en-US" b="1" dirty="0">
+                <a:latin typeface="Lato"/>
+                <a:ea typeface="Lato"/>
+                <a:cs typeface="Lato"/>
+                <a:sym typeface="Lato"/>
+              </a:rPr>
+              <a:t>Types of Constraints:  https://www.tutorialspoINT.com/sql/sql-constraINTs.htm */</a:t>
             </a:r>
             <a:endParaRPr dirty="0"/>
           </a:p>
@@ -4482,15 +4770,7 @@
             </a:pPr>
             <a:r>
               <a:rPr lang="en-US" sz="1200" dirty="0"/>
-              <a:t>DROP </a:t>
-            </a:r>
-            <a:r>
-              <a:rPr lang="en-US" sz="1200" dirty="0" err="1"/>
-              <a:t>constraINT</a:t>
-            </a:r>
-            <a:r>
-              <a:rPr lang="en-US" sz="1200" dirty="0"/>
-              <a:t> customers_ibfk_1;</a:t>
+              <a:t>DROP CONSTRAINT customers_ibfk_1;</a:t>
             </a:r>
           </a:p>
           <a:p>
@@ -4864,7 +5144,7 @@
               <a:buNone/>
             </a:pPr>
             <a:r>
-              <a:rPr lang="en-US" sz="1200" u="sng" dirty="0">
+              <a:rPr lang="en-US" sz="1200" u="none" dirty="0">
                 <a:solidFill>
                   <a:schemeClr val="accent1"/>
                 </a:solidFill>
@@ -4873,10 +5153,10 @@
                 <a:cs typeface="Lato"/>
                 <a:sym typeface="Lato"/>
               </a:rPr>
-              <a:t>UPDATE</a:t>
-            </a:r>
-            <a:r>
-              <a:rPr lang="en-US" sz="1200" dirty="0">
+              <a:t>UPDATE  </a:t>
+            </a:r>
+            <a:r>
+              <a:rPr lang="en-US" sz="1200" u="none" dirty="0" err="1">
                 <a:solidFill>
                   <a:schemeClr val="accent1"/>
                 </a:solidFill>
@@ -4885,22 +5165,10 @@
                 <a:cs typeface="Lato"/>
                 <a:sym typeface="Lato"/>
               </a:rPr>
-              <a:t>  </a:t>
-            </a:r>
-            <a:r>
-              <a:rPr lang="en-US" sz="1200" dirty="0" err="1">
-                <a:solidFill>
-                  <a:schemeClr val="accent1"/>
-                </a:solidFill>
-                <a:latin typeface="Lato"/>
-                <a:ea typeface="Lato"/>
-                <a:cs typeface="Lato"/>
-                <a:sym typeface="Lato"/>
-              </a:rPr>
               <a:t>classicmodels.customers</a:t>
             </a:r>
             <a:r>
-              <a:rPr lang="en-US" sz="1200" u="sng" dirty="0">
+              <a:rPr lang="en-US" sz="1200" u="none" dirty="0">
                 <a:solidFill>
                   <a:schemeClr val="accent1"/>
                 </a:solidFill>
@@ -4931,7 +5199,7 @@
               <a:buNone/>
             </a:pPr>
             <a:r>
-              <a:rPr lang="en-US" sz="1200" dirty="0">
+              <a:rPr lang="en-US" sz="1200" u="none" dirty="0">
                 <a:solidFill>
                   <a:schemeClr val="accent1"/>
                 </a:solidFill>
@@ -4940,7 +5208,7 @@
                 <a:cs typeface="Lato"/>
                 <a:sym typeface="Lato"/>
               </a:rPr>
-              <a:t>SET city = 'Omaha’</a:t>
+              <a:t>SET city = 'Omaha', state = 'NE’</a:t>
             </a:r>
           </a:p>
           <a:p>
@@ -4962,7 +5230,7 @@
               <a:buNone/>
             </a:pPr>
             <a:r>
-              <a:rPr lang="en-US" sz="1200" dirty="0">
+              <a:rPr lang="en-US" sz="1200" u="none" dirty="0">
                 <a:solidFill>
                   <a:schemeClr val="accent1"/>
                 </a:solidFill>
@@ -4974,7 +5242,7 @@
               <a:t>WHERE </a:t>
             </a:r>
             <a:r>
-              <a:rPr lang="en-US" sz="1200" dirty="0" err="1">
+              <a:rPr lang="en-US" sz="1200" u="none" dirty="0" err="1">
                 <a:solidFill>
                   <a:schemeClr val="accent1"/>
                 </a:solidFill>
@@ -4986,7 +5254,7 @@
               <a:t>customer_number</a:t>
             </a:r>
             <a:r>
-              <a:rPr lang="en-US" sz="1200" dirty="0">
+              <a:rPr lang="en-US" sz="1200" u="none" dirty="0">
                 <a:solidFill>
                   <a:schemeClr val="accent1"/>
                 </a:solidFill>
@@ -4997,18 +5265,7 @@
               </a:rPr>
               <a:t> = 103;</a:t>
             </a:r>
-          </a:p>
-          <a:p>
-            <a:pPr marL="0" lvl="0" indent="0" algn="l" rtl="0">
-              <a:spcBef>
-                <a:spcPts val="0"/>
-              </a:spcBef>
-              <a:spcAft>
-                <a:spcPts val="0"/>
-              </a:spcAft>
-              <a:buNone/>
-            </a:pPr>
-            <a:endParaRPr dirty="0"/>
+            <a:endParaRPr u="none" dirty="0"/>
           </a:p>
         </p:txBody>
       </p:sp>
@@ -6389,690 +6646,6 @@
 </p:sldLayout>
 </file>
 
-<file path=ppt/slideLayouts/slideLayout12.xml><?xml version="1.0" encoding="utf-8"?>
-<p:sldLayout xmlns:a="http://schemas.openxmlformats.org/drawingml/2006/main" xmlns:r="http://schemas.openxmlformats.org/officeDocument/2006/relationships" xmlns:p="http://schemas.openxmlformats.org/presentationml/2006/main" matchingName="Title and Content" type="obj">
-  <p:cSld name="OBJECT">
-    <p:spTree>
-      <p:nvGrpSpPr>
-        <p:cNvPr id="1" name="Shape 86"/>
-        <p:cNvGrpSpPr/>
-        <p:nvPr/>
-      </p:nvGrpSpPr>
-      <p:grpSpPr>
-        <a:xfrm>
-          <a:off x="0" y="0"/>
-          <a:ext cx="0" cy="0"/>
-          <a:chOff x="0" y="0"/>
-          <a:chExt cx="0" cy="0"/>
-        </a:xfrm>
-      </p:grpSpPr>
-      <p:sp>
-        <p:nvSpPr>
-          <p:cNvPr id="87" name="Google Shape;87;p13"/>
-          <p:cNvSpPr txBox="1">
-            <a:spLocks noGrp="1"/>
-          </p:cNvSpPr>
-          <p:nvPr>
-            <p:ph type="title"/>
-          </p:nvPr>
-        </p:nvSpPr>
-        <p:spPr>
-          <a:xfrm>
-            <a:off x="913795" y="609600"/>
-            <a:ext cx="10353900" cy="970500"/>
-          </a:xfrm>
-          <a:prstGeom prst="rect">
-            <a:avLst/>
-          </a:prstGeom>
-          <a:noFill/>
-          <a:ln>
-            <a:noFill/>
-          </a:ln>
-          <a:effectLst>
-            <a:outerShdw blurRad="25400">
-              <a:srgbClr val="000000">
-                <a:alpha val="45880"/>
-              </a:srgbClr>
-            </a:outerShdw>
-          </a:effectLst>
-        </p:spPr>
-        <p:txBody>
-          <a:bodyPr spcFirstLastPara="1" wrap="square" lIns="91425" tIns="45700" rIns="91425" bIns="45700" anchor="ctr" anchorCtr="0">
-            <a:noAutofit/>
-          </a:bodyPr>
-          <a:lstStyle>
-            <a:lvl1pPr lvl="0" algn="ctr" rtl="0">
-              <a:spcBef>
-                <a:spcPts val="0"/>
-              </a:spcBef>
-              <a:spcAft>
-                <a:spcPts val="0"/>
-              </a:spcAft>
-              <a:buClr>
-                <a:schemeClr val="lt2"/>
-              </a:buClr>
-              <a:buSzPts val="1800"/>
-              <a:buNone/>
-              <a:defRPr/>
-            </a:lvl1pPr>
-            <a:lvl2pPr lvl="1" algn="l" rtl="0">
-              <a:spcBef>
-                <a:spcPts val="0"/>
-              </a:spcBef>
-              <a:spcAft>
-                <a:spcPts val="0"/>
-              </a:spcAft>
-              <a:buSzPts val="3700"/>
-              <a:buNone/>
-              <a:defRPr/>
-            </a:lvl2pPr>
-            <a:lvl3pPr lvl="2" algn="l" rtl="0">
-              <a:spcBef>
-                <a:spcPts val="0"/>
-              </a:spcBef>
-              <a:spcAft>
-                <a:spcPts val="0"/>
-              </a:spcAft>
-              <a:buSzPts val="3700"/>
-              <a:buNone/>
-              <a:defRPr/>
-            </a:lvl3pPr>
-            <a:lvl4pPr lvl="3" algn="l" rtl="0">
-              <a:spcBef>
-                <a:spcPts val="0"/>
-              </a:spcBef>
-              <a:spcAft>
-                <a:spcPts val="0"/>
-              </a:spcAft>
-              <a:buSzPts val="3700"/>
-              <a:buNone/>
-              <a:defRPr/>
-            </a:lvl4pPr>
-            <a:lvl5pPr lvl="4" algn="l" rtl="0">
-              <a:spcBef>
-                <a:spcPts val="0"/>
-              </a:spcBef>
-              <a:spcAft>
-                <a:spcPts val="0"/>
-              </a:spcAft>
-              <a:buSzPts val="3700"/>
-              <a:buNone/>
-              <a:defRPr/>
-            </a:lvl5pPr>
-            <a:lvl6pPr lvl="5" algn="l" rtl="0">
-              <a:spcBef>
-                <a:spcPts val="0"/>
-              </a:spcBef>
-              <a:spcAft>
-                <a:spcPts val="0"/>
-              </a:spcAft>
-              <a:buSzPts val="3700"/>
-              <a:buNone/>
-              <a:defRPr/>
-            </a:lvl6pPr>
-            <a:lvl7pPr lvl="6" algn="l" rtl="0">
-              <a:spcBef>
-                <a:spcPts val="0"/>
-              </a:spcBef>
-              <a:spcAft>
-                <a:spcPts val="0"/>
-              </a:spcAft>
-              <a:buSzPts val="3700"/>
-              <a:buNone/>
-              <a:defRPr/>
-            </a:lvl7pPr>
-            <a:lvl8pPr lvl="7" algn="l" rtl="0">
-              <a:spcBef>
-                <a:spcPts val="0"/>
-              </a:spcBef>
-              <a:spcAft>
-                <a:spcPts val="0"/>
-              </a:spcAft>
-              <a:buSzPts val="3700"/>
-              <a:buNone/>
-              <a:defRPr/>
-            </a:lvl8pPr>
-            <a:lvl9pPr lvl="8" algn="l" rtl="0">
-              <a:spcBef>
-                <a:spcPts val="0"/>
-              </a:spcBef>
-              <a:spcAft>
-                <a:spcPts val="0"/>
-              </a:spcAft>
-              <a:buSzPts val="3700"/>
-              <a:buNone/>
-              <a:defRPr/>
-            </a:lvl9pPr>
-          </a:lstStyle>
-          <a:p>
-            <a:endParaRPr/>
-          </a:p>
-        </p:txBody>
-      </p:sp>
-      <p:sp>
-        <p:nvSpPr>
-          <p:cNvPr id="88" name="Google Shape;88;p13"/>
-          <p:cNvSpPr txBox="1">
-            <a:spLocks noGrp="1"/>
-          </p:cNvSpPr>
-          <p:nvPr>
-            <p:ph type="body" idx="1"/>
-          </p:nvPr>
-        </p:nvSpPr>
-        <p:spPr>
-          <a:xfrm>
-            <a:off x="913795" y="1732449"/>
-            <a:ext cx="10353900" cy="4058700"/>
-          </a:xfrm>
-          <a:prstGeom prst="rect">
-            <a:avLst/>
-          </a:prstGeom>
-          <a:noFill/>
-          <a:ln>
-            <a:noFill/>
-          </a:ln>
-          <a:effectLst>
-            <a:outerShdw blurRad="25400">
-              <a:srgbClr val="000000">
-                <a:alpha val="45880"/>
-              </a:srgbClr>
-            </a:outerShdw>
-          </a:effectLst>
-        </p:spPr>
-        <p:txBody>
-          <a:bodyPr spcFirstLastPara="1" wrap="square" lIns="91425" tIns="45700" rIns="91425" bIns="45700" anchor="t" anchorCtr="0">
-            <a:noAutofit/>
-          </a:bodyPr>
-          <a:lstStyle>
-            <a:lvl1pPr marL="457200" lvl="0" indent="-308610" algn="l" rtl="0">
-              <a:spcBef>
-                <a:spcPts val="360"/>
-              </a:spcBef>
-              <a:spcAft>
-                <a:spcPts val="0"/>
-              </a:spcAft>
-              <a:buSzPts val="1260"/>
-              <a:buChar char="●"/>
-              <a:defRPr/>
-            </a:lvl1pPr>
-            <a:lvl2pPr marL="914400" lvl="1" indent="-308610" algn="l" rtl="0">
-              <a:spcBef>
-                <a:spcPts val="600"/>
-              </a:spcBef>
-              <a:spcAft>
-                <a:spcPts val="0"/>
-              </a:spcAft>
-              <a:buSzPts val="1260"/>
-              <a:buChar char="○"/>
-              <a:defRPr/>
-            </a:lvl2pPr>
-            <a:lvl3pPr marL="1371600" lvl="2" indent="-308610" algn="l" rtl="0">
-              <a:spcBef>
-                <a:spcPts val="600"/>
-              </a:spcBef>
-              <a:spcAft>
-                <a:spcPts val="0"/>
-              </a:spcAft>
-              <a:buSzPts val="1260"/>
-              <a:buChar char="■"/>
-              <a:defRPr/>
-            </a:lvl3pPr>
-            <a:lvl4pPr marL="1828800" lvl="3" indent="-308610" algn="l" rtl="0">
-              <a:spcBef>
-                <a:spcPts val="600"/>
-              </a:spcBef>
-              <a:spcAft>
-                <a:spcPts val="0"/>
-              </a:spcAft>
-              <a:buSzPts val="1260"/>
-              <a:buChar char="●"/>
-              <a:defRPr/>
-            </a:lvl4pPr>
-            <a:lvl5pPr marL="2286000" lvl="4" indent="-308610" algn="l" rtl="0">
-              <a:spcBef>
-                <a:spcPts val="600"/>
-              </a:spcBef>
-              <a:spcAft>
-                <a:spcPts val="0"/>
-              </a:spcAft>
-              <a:buSzPts val="1260"/>
-              <a:buChar char="○"/>
-              <a:defRPr/>
-            </a:lvl5pPr>
-            <a:lvl6pPr marL="2743200" lvl="5" indent="-308610" algn="l" rtl="0">
-              <a:spcBef>
-                <a:spcPts val="600"/>
-              </a:spcBef>
-              <a:spcAft>
-                <a:spcPts val="0"/>
-              </a:spcAft>
-              <a:buSzPts val="1260"/>
-              <a:buChar char="■"/>
-              <a:defRPr/>
-            </a:lvl6pPr>
-            <a:lvl7pPr marL="3200400" lvl="6" indent="-308610" algn="l" rtl="0">
-              <a:spcBef>
-                <a:spcPts val="600"/>
-              </a:spcBef>
-              <a:spcAft>
-                <a:spcPts val="0"/>
-              </a:spcAft>
-              <a:buSzPts val="1260"/>
-              <a:buChar char="●"/>
-              <a:defRPr/>
-            </a:lvl7pPr>
-            <a:lvl8pPr marL="3657600" lvl="7" indent="-308609" algn="l" rtl="0">
-              <a:spcBef>
-                <a:spcPts val="600"/>
-              </a:spcBef>
-              <a:spcAft>
-                <a:spcPts val="0"/>
-              </a:spcAft>
-              <a:buSzPts val="1260"/>
-              <a:buChar char="○"/>
-              <a:defRPr/>
-            </a:lvl8pPr>
-            <a:lvl9pPr marL="4114800" lvl="8" indent="-308609" algn="l" rtl="0">
-              <a:spcBef>
-                <a:spcPts val="600"/>
-              </a:spcBef>
-              <a:spcAft>
-                <a:spcPts val="600"/>
-              </a:spcAft>
-              <a:buSzPts val="1260"/>
-              <a:buChar char="■"/>
-              <a:defRPr/>
-            </a:lvl9pPr>
-          </a:lstStyle>
-          <a:p>
-            <a:endParaRPr/>
-          </a:p>
-        </p:txBody>
-      </p:sp>
-      <p:sp>
-        <p:nvSpPr>
-          <p:cNvPr id="89" name="Google Shape;89;p13"/>
-          <p:cNvSpPr txBox="1">
-            <a:spLocks noGrp="1"/>
-          </p:cNvSpPr>
-          <p:nvPr>
-            <p:ph type="dt" idx="10"/>
-          </p:nvPr>
-        </p:nvSpPr>
-        <p:spPr>
-          <a:xfrm>
-            <a:off x="7678736" y="5883275"/>
-            <a:ext cx="2743200" cy="365100"/>
-          </a:xfrm>
-          <a:prstGeom prst="rect">
-            <a:avLst/>
-          </a:prstGeom>
-          <a:noFill/>
-          <a:ln>
-            <a:noFill/>
-          </a:ln>
-        </p:spPr>
-        <p:txBody>
-          <a:bodyPr spcFirstLastPara="1" wrap="square" lIns="91425" tIns="45700" rIns="91425" bIns="45700" anchor="ctr" anchorCtr="0">
-            <a:noAutofit/>
-          </a:bodyPr>
-          <a:lstStyle>
-            <a:lvl1pPr lvl="0" algn="r" rtl="0">
-              <a:spcBef>
-                <a:spcPts val="0"/>
-              </a:spcBef>
-              <a:spcAft>
-                <a:spcPts val="0"/>
-              </a:spcAft>
-              <a:buSzPts val="1400"/>
-              <a:buNone/>
-              <a:defRPr/>
-            </a:lvl1pPr>
-            <a:lvl2pPr lvl="1" algn="l" rtl="0">
-              <a:spcBef>
-                <a:spcPts val="0"/>
-              </a:spcBef>
-              <a:spcAft>
-                <a:spcPts val="0"/>
-              </a:spcAft>
-              <a:buSzPts val="1400"/>
-              <a:buNone/>
-              <a:defRPr/>
-            </a:lvl2pPr>
-            <a:lvl3pPr lvl="2" algn="l" rtl="0">
-              <a:spcBef>
-                <a:spcPts val="0"/>
-              </a:spcBef>
-              <a:spcAft>
-                <a:spcPts val="0"/>
-              </a:spcAft>
-              <a:buSzPts val="1400"/>
-              <a:buNone/>
-              <a:defRPr/>
-            </a:lvl3pPr>
-            <a:lvl4pPr lvl="3" algn="l" rtl="0">
-              <a:spcBef>
-                <a:spcPts val="0"/>
-              </a:spcBef>
-              <a:spcAft>
-                <a:spcPts val="0"/>
-              </a:spcAft>
-              <a:buSzPts val="1400"/>
-              <a:buNone/>
-              <a:defRPr/>
-            </a:lvl4pPr>
-            <a:lvl5pPr lvl="4" algn="l" rtl="0">
-              <a:spcBef>
-                <a:spcPts val="0"/>
-              </a:spcBef>
-              <a:spcAft>
-                <a:spcPts val="0"/>
-              </a:spcAft>
-              <a:buSzPts val="1400"/>
-              <a:buNone/>
-              <a:defRPr/>
-            </a:lvl5pPr>
-            <a:lvl6pPr lvl="5" algn="l" rtl="0">
-              <a:spcBef>
-                <a:spcPts val="0"/>
-              </a:spcBef>
-              <a:spcAft>
-                <a:spcPts val="0"/>
-              </a:spcAft>
-              <a:buSzPts val="1400"/>
-              <a:buNone/>
-              <a:defRPr/>
-            </a:lvl6pPr>
-            <a:lvl7pPr lvl="6" algn="l" rtl="0">
-              <a:spcBef>
-                <a:spcPts val="0"/>
-              </a:spcBef>
-              <a:spcAft>
-                <a:spcPts val="0"/>
-              </a:spcAft>
-              <a:buSzPts val="1400"/>
-              <a:buNone/>
-              <a:defRPr/>
-            </a:lvl7pPr>
-            <a:lvl8pPr lvl="7" algn="l" rtl="0">
-              <a:spcBef>
-                <a:spcPts val="0"/>
-              </a:spcBef>
-              <a:spcAft>
-                <a:spcPts val="0"/>
-              </a:spcAft>
-              <a:buSzPts val="1400"/>
-              <a:buNone/>
-              <a:defRPr/>
-            </a:lvl8pPr>
-            <a:lvl9pPr lvl="8" algn="l" rtl="0">
-              <a:spcBef>
-                <a:spcPts val="0"/>
-              </a:spcBef>
-              <a:spcAft>
-                <a:spcPts val="0"/>
-              </a:spcAft>
-              <a:buSzPts val="1400"/>
-              <a:buNone/>
-              <a:defRPr/>
-            </a:lvl9pPr>
-          </a:lstStyle>
-          <a:p>
-            <a:endParaRPr/>
-          </a:p>
-        </p:txBody>
-      </p:sp>
-      <p:sp>
-        <p:nvSpPr>
-          <p:cNvPr id="90" name="Google Shape;90;p13"/>
-          <p:cNvSpPr txBox="1">
-            <a:spLocks noGrp="1"/>
-          </p:cNvSpPr>
-          <p:nvPr>
-            <p:ph type="ftr" idx="11"/>
-          </p:nvPr>
-        </p:nvSpPr>
-        <p:spPr>
-          <a:xfrm>
-            <a:off x="913795" y="5883275"/>
-            <a:ext cx="6672900" cy="365100"/>
-          </a:xfrm>
-          <a:prstGeom prst="rect">
-            <a:avLst/>
-          </a:prstGeom>
-          <a:noFill/>
-          <a:ln>
-            <a:noFill/>
-          </a:ln>
-        </p:spPr>
-        <p:txBody>
-          <a:bodyPr spcFirstLastPara="1" wrap="square" lIns="91425" tIns="45700" rIns="91425" bIns="45700" anchor="ctr" anchorCtr="0">
-            <a:noAutofit/>
-          </a:bodyPr>
-          <a:lstStyle>
-            <a:lvl1pPr lvl="0" algn="l" rtl="0">
-              <a:spcBef>
-                <a:spcPts val="0"/>
-              </a:spcBef>
-              <a:spcAft>
-                <a:spcPts val="0"/>
-              </a:spcAft>
-              <a:buSzPts val="1400"/>
-              <a:buNone/>
-              <a:defRPr/>
-            </a:lvl1pPr>
-            <a:lvl2pPr lvl="1" algn="l" rtl="0">
-              <a:spcBef>
-                <a:spcPts val="0"/>
-              </a:spcBef>
-              <a:spcAft>
-                <a:spcPts val="0"/>
-              </a:spcAft>
-              <a:buSzPts val="1400"/>
-              <a:buNone/>
-              <a:defRPr/>
-            </a:lvl2pPr>
-            <a:lvl3pPr lvl="2" algn="l" rtl="0">
-              <a:spcBef>
-                <a:spcPts val="0"/>
-              </a:spcBef>
-              <a:spcAft>
-                <a:spcPts val="0"/>
-              </a:spcAft>
-              <a:buSzPts val="1400"/>
-              <a:buNone/>
-              <a:defRPr/>
-            </a:lvl3pPr>
-            <a:lvl4pPr lvl="3" algn="l" rtl="0">
-              <a:spcBef>
-                <a:spcPts val="0"/>
-              </a:spcBef>
-              <a:spcAft>
-                <a:spcPts val="0"/>
-              </a:spcAft>
-              <a:buSzPts val="1400"/>
-              <a:buNone/>
-              <a:defRPr/>
-            </a:lvl4pPr>
-            <a:lvl5pPr lvl="4" algn="l" rtl="0">
-              <a:spcBef>
-                <a:spcPts val="0"/>
-              </a:spcBef>
-              <a:spcAft>
-                <a:spcPts val="0"/>
-              </a:spcAft>
-              <a:buSzPts val="1400"/>
-              <a:buNone/>
-              <a:defRPr/>
-            </a:lvl5pPr>
-            <a:lvl6pPr lvl="5" algn="l" rtl="0">
-              <a:spcBef>
-                <a:spcPts val="0"/>
-              </a:spcBef>
-              <a:spcAft>
-                <a:spcPts val="0"/>
-              </a:spcAft>
-              <a:buSzPts val="1400"/>
-              <a:buNone/>
-              <a:defRPr/>
-            </a:lvl6pPr>
-            <a:lvl7pPr lvl="6" algn="l" rtl="0">
-              <a:spcBef>
-                <a:spcPts val="0"/>
-              </a:spcBef>
-              <a:spcAft>
-                <a:spcPts val="0"/>
-              </a:spcAft>
-              <a:buSzPts val="1400"/>
-              <a:buNone/>
-              <a:defRPr/>
-            </a:lvl7pPr>
-            <a:lvl8pPr lvl="7" algn="l" rtl="0">
-              <a:spcBef>
-                <a:spcPts val="0"/>
-              </a:spcBef>
-              <a:spcAft>
-                <a:spcPts val="0"/>
-              </a:spcAft>
-              <a:buSzPts val="1400"/>
-              <a:buNone/>
-              <a:defRPr/>
-            </a:lvl8pPr>
-            <a:lvl9pPr lvl="8" algn="l" rtl="0">
-              <a:spcBef>
-                <a:spcPts val="0"/>
-              </a:spcBef>
-              <a:spcAft>
-                <a:spcPts val="0"/>
-              </a:spcAft>
-              <a:buSzPts val="1400"/>
-              <a:buNone/>
-              <a:defRPr/>
-            </a:lvl9pPr>
-          </a:lstStyle>
-          <a:p>
-            <a:endParaRPr/>
-          </a:p>
-        </p:txBody>
-      </p:sp>
-      <p:sp>
-        <p:nvSpPr>
-          <p:cNvPr id="91" name="Google Shape;91;p13"/>
-          <p:cNvSpPr txBox="1">
-            <a:spLocks noGrp="1"/>
-          </p:cNvSpPr>
-          <p:nvPr>
-            <p:ph type="sldNum" idx="12"/>
-          </p:nvPr>
-        </p:nvSpPr>
-        <p:spPr>
-          <a:xfrm>
-            <a:off x="10514011" y="5883275"/>
-            <a:ext cx="753600" cy="365100"/>
-          </a:xfrm>
-          <a:prstGeom prst="rect">
-            <a:avLst/>
-          </a:prstGeom>
-          <a:noFill/>
-          <a:ln>
-            <a:noFill/>
-          </a:ln>
-        </p:spPr>
-        <p:txBody>
-          <a:bodyPr spcFirstLastPara="1" wrap="square" lIns="91425" tIns="45700" rIns="91425" bIns="45700" anchor="ctr" anchorCtr="0">
-            <a:noAutofit/>
-          </a:bodyPr>
-          <a:lstStyle>
-            <a:lvl1pPr marL="0" lvl="0" indent="0" algn="r" rtl="0">
-              <a:spcBef>
-                <a:spcPts val="0"/>
-              </a:spcBef>
-              <a:buNone/>
-              <a:defRPr/>
-            </a:lvl1pPr>
-            <a:lvl2pPr marL="0" lvl="1" indent="0" algn="r" rtl="0">
-              <a:spcBef>
-                <a:spcPts val="0"/>
-              </a:spcBef>
-              <a:buNone/>
-              <a:defRPr/>
-            </a:lvl2pPr>
-            <a:lvl3pPr marL="0" lvl="2" indent="0" algn="r" rtl="0">
-              <a:spcBef>
-                <a:spcPts val="0"/>
-              </a:spcBef>
-              <a:buNone/>
-              <a:defRPr/>
-            </a:lvl3pPr>
-            <a:lvl4pPr marL="0" lvl="3" indent="0" algn="r" rtl="0">
-              <a:spcBef>
-                <a:spcPts val="0"/>
-              </a:spcBef>
-              <a:buNone/>
-              <a:defRPr/>
-            </a:lvl4pPr>
-            <a:lvl5pPr marL="0" lvl="4" indent="0" algn="r" rtl="0">
-              <a:spcBef>
-                <a:spcPts val="0"/>
-              </a:spcBef>
-              <a:buNone/>
-              <a:defRPr/>
-            </a:lvl5pPr>
-            <a:lvl6pPr marL="0" lvl="5" indent="0" algn="r" rtl="0">
-              <a:spcBef>
-                <a:spcPts val="0"/>
-              </a:spcBef>
-              <a:buNone/>
-              <a:defRPr/>
-            </a:lvl6pPr>
-            <a:lvl7pPr marL="0" lvl="6" indent="0" algn="r" rtl="0">
-              <a:spcBef>
-                <a:spcPts val="0"/>
-              </a:spcBef>
-              <a:buNone/>
-              <a:defRPr/>
-            </a:lvl7pPr>
-            <a:lvl8pPr marL="0" lvl="7" indent="0" algn="r" rtl="0">
-              <a:spcBef>
-                <a:spcPts val="0"/>
-              </a:spcBef>
-              <a:buNone/>
-              <a:defRPr/>
-            </a:lvl8pPr>
-            <a:lvl9pPr marL="0" lvl="8" indent="0" algn="r" rtl="0">
-              <a:spcBef>
-                <a:spcPts val="0"/>
-              </a:spcBef>
-              <a:buNone/>
-              <a:defRPr/>
-            </a:lvl9pPr>
-          </a:lstStyle>
-          <a:p>
-            <a:pPr marL="0" lvl="0" indent="0" algn="r" rtl="0">
-              <a:spcBef>
-                <a:spcPts val="0"/>
-              </a:spcBef>
-              <a:spcAft>
-                <a:spcPts val="0"/>
-              </a:spcAft>
-              <a:buNone/>
-            </a:pPr>
-            <a:fld id="{00000000-1234-1234-1234-123412341234}" type="slidenum">
-              <a:rPr lang="en-US"/>
-              <a:t>‹#›</a:t>
-            </a:fld>
-            <a:endParaRPr/>
-          </a:p>
-        </p:txBody>
-      </p:sp>
-    </p:spTree>
-  </p:cSld>
-  <p:clrMapOvr>
-    <a:masterClrMapping/>
-  </p:clrMapOvr>
-</p:sldLayout>
-</file>
-
 <file path=ppt/slideLayouts/slideLayout2.xml><?xml version="1.0" encoding="utf-8"?>
 <p:sldLayout xmlns:a="http://schemas.openxmlformats.org/drawingml/2006/main" xmlns:r="http://schemas.openxmlformats.org/officeDocument/2006/relationships" xmlns:p="http://schemas.openxmlformats.org/presentationml/2006/main" matchingName="Section header" type="secHead">
   <p:cSld name="SECTION_HEADER">
@@ -11697,7 +11270,6 @@
     <p:sldLayoutId id="2147483656" r:id="rId9"/>
     <p:sldLayoutId id="2147483657" r:id="rId10"/>
     <p:sldLayoutId id="2147483658" r:id="rId11"/>
-    <p:sldLayoutId id="2147483659" r:id="rId12"/>
   </p:sldLayoutIdLst>
   <p:hf sldNum="0" hdr="0" ftr="0" dt="0"/>
   <p:txStyles>
@@ -13672,7 +13244,7 @@
                 <a:cs typeface="Lato"/>
                 <a:sym typeface="Lato"/>
               </a:rPr>
-              <a:t>world.vw_countries_asia</a:t>
+              <a:t>world.countries_asia</a:t>
             </a:r>
             <a:r>
               <a:rPr lang="en-US" sz="2000" b="1" dirty="0">
@@ -13740,7 +13312,7 @@
                 <a:cs typeface="Lato"/>
                 <a:sym typeface="Lato"/>
               </a:rPr>
-              <a:t>tbl.Name</a:t>
+              <a:t>tbl</a:t>
             </a:r>
             <a:r>
               <a:rPr lang="en-US" sz="2000" dirty="0">
@@ -13752,7 +13324,7 @@
                 <a:cs typeface="Lato"/>
                 <a:sym typeface="Lato"/>
               </a:rPr>
-              <a:t> AS country</a:t>
+              <a:t>.`name` AS country</a:t>
             </a:r>
             <a:endParaRPr sz="2000" dirty="0">
               <a:solidFill>
@@ -13836,17 +13408,10 @@
             </a:endParaRPr>
           </a:p>
           <a:p>
-            <a:pPr marL="0" lvl="0" indent="0" algn="l" rtl="0">
+            <a:pPr lvl="0">
               <a:lnSpc>
                 <a:spcPct val="115000"/>
               </a:lnSpc>
-              <a:spcBef>
-                <a:spcPts val="0"/>
-              </a:spcBef>
-              <a:spcAft>
-                <a:spcPts val="0"/>
-              </a:spcAft>
-              <a:buNone/>
             </a:pPr>
             <a:r>
               <a:rPr lang="en-US" sz="2000" dirty="0">
@@ -14054,7 +13619,7 @@
                 <a:cs typeface="Lato"/>
                 <a:sym typeface="Lato"/>
               </a:rPr>
-              <a:t>  WHERE  Country IN ('India', 'China', 'Nepal')</a:t>
+              <a:t>  WHERE country IN ('India', 'China', 'Nepal')</a:t>
             </a:r>
             <a:endParaRPr sz="2000" dirty="0">
               <a:latin typeface="Lato"/>
@@ -14625,6 +14190,1104 @@
         </p:txBody>
       </p:sp>
     </p:spTree>
+  </p:cSld>
+  <p:clrMapOvr>
+    <a:masterClrMapping/>
+  </p:clrMapOvr>
+</p:sld>
+</file>
+
+<file path=ppt/slides/slide13.xml><?xml version="1.0" encoding="utf-8"?>
+<p:sld xmlns:a="http://schemas.openxmlformats.org/drawingml/2006/main" xmlns:r="http://schemas.openxmlformats.org/officeDocument/2006/relationships" xmlns:p="http://schemas.openxmlformats.org/presentationml/2006/main">
+  <p:cSld>
+    <p:spTree>
+      <p:nvGrpSpPr>
+        <p:cNvPr id="1" name="Shape 281"/>
+        <p:cNvGrpSpPr/>
+        <p:nvPr/>
+      </p:nvGrpSpPr>
+      <p:grpSpPr>
+        <a:xfrm>
+          <a:off x="0" y="0"/>
+          <a:ext cx="0" cy="0"/>
+          <a:chOff x="0" y="0"/>
+          <a:chExt cx="0" cy="0"/>
+        </a:xfrm>
+      </p:grpSpPr>
+      <p:sp>
+        <p:nvSpPr>
+          <p:cNvPr id="282" name="Google Shape;282;p40"/>
+          <p:cNvSpPr txBox="1">
+            <a:spLocks noGrp="1"/>
+          </p:cNvSpPr>
+          <p:nvPr>
+            <p:ph type="ctrTitle"/>
+          </p:nvPr>
+        </p:nvSpPr>
+        <p:spPr>
+          <a:xfrm>
+            <a:off x="972825" y="697317"/>
+            <a:ext cx="10250700" cy="2219700"/>
+          </a:xfrm>
+          <a:prstGeom prst="rect">
+            <a:avLst/>
+          </a:prstGeom>
+        </p:spPr>
+        <p:txBody>
+          <a:bodyPr spcFirstLastPara="1" wrap="square" lIns="121900" tIns="121900" rIns="121900" bIns="121900" anchor="t" anchorCtr="0">
+            <a:noAutofit/>
+          </a:bodyPr>
+          <a:lstStyle/>
+          <a:p>
+            <a:pPr marL="0" lvl="0" indent="0" algn="l" rtl="0">
+              <a:spcBef>
+                <a:spcPts val="0"/>
+              </a:spcBef>
+              <a:spcAft>
+                <a:spcPts val="0"/>
+              </a:spcAft>
+              <a:buNone/>
+            </a:pPr>
+            <a:r>
+              <a:rPr lang="en-US" sz="4800" dirty="0"/>
+              <a:t>Appendix A – Stored Procedures</a:t>
+            </a:r>
+            <a:endParaRPr sz="4800" dirty="0"/>
+          </a:p>
+        </p:txBody>
+      </p:sp>
+      <p:sp>
+        <p:nvSpPr>
+          <p:cNvPr id="2" name="Rectangle 1">
+            <a:extLst>
+              <a:ext uri="{FF2B5EF4-FFF2-40B4-BE49-F238E27FC236}">
+                <a16:creationId xmlns:a16="http://schemas.microsoft.com/office/drawing/2014/main" id="{BCB4BAF3-50DB-4C6B-8297-FDD3A9D2D227}"/>
+              </a:ext>
+            </a:extLst>
+          </p:cNvPr>
+          <p:cNvSpPr/>
+          <p:nvPr/>
+        </p:nvSpPr>
+        <p:spPr>
+          <a:xfrm>
+            <a:off x="360608" y="1807167"/>
+            <a:ext cx="11552350" cy="4117281"/>
+          </a:xfrm>
+          <a:prstGeom prst="rect">
+            <a:avLst/>
+          </a:prstGeom>
+        </p:spPr>
+        <p:txBody>
+          <a:bodyPr wrap="square">
+            <a:spAutoFit/>
+          </a:bodyPr>
+          <a:lstStyle/>
+          <a:p>
+            <a:pPr>
+              <a:lnSpc>
+                <a:spcPct val="120000"/>
+              </a:lnSpc>
+            </a:pPr>
+            <a:r>
+              <a:rPr lang="en-US" altLang="en-US" sz="2000" b="1" dirty="0">
+                <a:latin typeface="Lato" panose="020B0604020202020204" charset="0"/>
+              </a:rPr>
+              <a:t>Definition:</a:t>
+            </a:r>
+            <a:r>
+              <a:rPr lang="en-US" altLang="en-US" sz="2000" dirty="0">
+                <a:latin typeface="Lato" panose="020B0604020202020204" charset="0"/>
+              </a:rPr>
+              <a:t> routines that do not return values and can take input or output parameters; called explicitly</a:t>
+            </a:r>
+          </a:p>
+          <a:p>
+            <a:pPr>
+              <a:lnSpc>
+                <a:spcPct val="120000"/>
+              </a:lnSpc>
+            </a:pPr>
+            <a:endParaRPr lang="en-US" altLang="en-US" sz="2000" dirty="0">
+              <a:solidFill>
+                <a:srgbClr val="383DBA"/>
+              </a:solidFill>
+              <a:latin typeface="Lato" panose="020B0604020202020204" charset="0"/>
+              <a:ea typeface="ヒラギノ角ゴ Pro W3" pitchFamily="-105" charset="-128"/>
+              <a:cs typeface="Courier New" panose="02070309020205020404" pitchFamily="49" charset="0"/>
+            </a:endParaRPr>
+          </a:p>
+          <a:p>
+            <a:pPr>
+              <a:lnSpc>
+                <a:spcPct val="120000"/>
+              </a:lnSpc>
+            </a:pPr>
+            <a:r>
+              <a:rPr lang="en-US" altLang="en-US" sz="2000" dirty="0">
+                <a:solidFill>
+                  <a:srgbClr val="383DBA"/>
+                </a:solidFill>
+                <a:latin typeface="Lato" panose="020B0604020202020204" charset="0"/>
+                <a:ea typeface="ヒラギノ角ゴ Pro W3" pitchFamily="-105" charset="-128"/>
+                <a:cs typeface="Courier New" panose="02070309020205020404" pitchFamily="49" charset="0"/>
+              </a:rPr>
+              <a:t>CREATE</a:t>
+            </a:r>
+            <a:r>
+              <a:rPr lang="en-US" altLang="en-US" sz="2000" dirty="0">
+                <a:latin typeface="Lato" panose="020B0604020202020204" charset="0"/>
+                <a:cs typeface="Courier New" panose="02070309020205020404" pitchFamily="49" charset="0"/>
+              </a:rPr>
+              <a:t> </a:t>
+            </a:r>
+            <a:r>
+              <a:rPr lang="en-US" altLang="en-US" sz="2000" dirty="0">
+                <a:solidFill>
+                  <a:srgbClr val="383DBA"/>
+                </a:solidFill>
+                <a:latin typeface="Lato" panose="020B0604020202020204" charset="0"/>
+                <a:ea typeface="ヒラギノ角ゴ Pro W3" pitchFamily="-105" charset="-128"/>
+                <a:cs typeface="Courier New" panose="02070309020205020404" pitchFamily="49" charset="0"/>
+              </a:rPr>
+              <a:t>PROCEDURE</a:t>
+            </a:r>
+            <a:r>
+              <a:rPr lang="en-US" altLang="en-US" sz="2000" dirty="0">
+                <a:latin typeface="Lato" panose="020B0604020202020204" charset="0"/>
+                <a:cs typeface="Courier New" panose="02070309020205020404" pitchFamily="49" charset="0"/>
+              </a:rPr>
+              <a:t> </a:t>
+            </a:r>
+            <a:r>
+              <a:rPr lang="en-US" altLang="en-US" sz="2000" dirty="0" err="1">
+                <a:solidFill>
+                  <a:srgbClr val="555555"/>
+                </a:solidFill>
+                <a:latin typeface="Lato" panose="020B0604020202020204" charset="0"/>
+                <a:cs typeface="Courier New" panose="02070309020205020404" pitchFamily="49" charset="0"/>
+              </a:rPr>
+              <a:t>procedure_name</a:t>
+            </a:r>
+            <a:r>
+              <a:rPr lang="en-US" altLang="en-US" sz="2000" dirty="0">
+                <a:solidFill>
+                  <a:srgbClr val="555555"/>
+                </a:solidFill>
+                <a:latin typeface="Lato" panose="020B0604020202020204" charset="0"/>
+                <a:cs typeface="Courier New" panose="02070309020205020404" pitchFamily="49" charset="0"/>
+              </a:rPr>
+              <a:t>(</a:t>
+            </a:r>
+            <a:r>
+              <a:rPr lang="en-US" altLang="en-US" sz="2000" dirty="0">
+                <a:solidFill>
+                  <a:srgbClr val="383DBA"/>
+                </a:solidFill>
+                <a:latin typeface="Lato" panose="020B0604020202020204" charset="0"/>
+                <a:ea typeface="ヒラギノ角ゴ Pro W3" pitchFamily="-105" charset="-128"/>
+                <a:cs typeface="Courier New" panose="02070309020205020404" pitchFamily="49" charset="0"/>
+              </a:rPr>
+              <a:t>IN</a:t>
+            </a:r>
+            <a:r>
+              <a:rPr lang="en-US" altLang="en-US" sz="2000" dirty="0">
+                <a:solidFill>
+                  <a:srgbClr val="555555"/>
+                </a:solidFill>
+                <a:latin typeface="Lato" panose="020B0604020202020204" charset="0"/>
+                <a:cs typeface="Courier New" panose="02070309020205020404" pitchFamily="49" charset="0"/>
+              </a:rPr>
+              <a:t>|</a:t>
+            </a:r>
+            <a:r>
+              <a:rPr lang="en-US" altLang="en-US" sz="2000" dirty="0">
+                <a:solidFill>
+                  <a:srgbClr val="383DBA"/>
+                </a:solidFill>
+                <a:latin typeface="Lato" panose="020B0604020202020204" charset="0"/>
+                <a:ea typeface="ヒラギノ角ゴ Pro W3" pitchFamily="-105" charset="-128"/>
+                <a:cs typeface="Courier New" panose="02070309020205020404" pitchFamily="49" charset="0"/>
+              </a:rPr>
+              <a:t>OUT</a:t>
+            </a:r>
+            <a:r>
+              <a:rPr lang="en-US" altLang="en-US" sz="2000" dirty="0">
+                <a:solidFill>
+                  <a:srgbClr val="555555"/>
+                </a:solidFill>
+                <a:latin typeface="Lato" panose="020B0604020202020204" charset="0"/>
+                <a:cs typeface="Courier New" panose="02070309020205020404" pitchFamily="49" charset="0"/>
+              </a:rPr>
+              <a:t>|</a:t>
+            </a:r>
+            <a:r>
+              <a:rPr lang="en-US" altLang="en-US" sz="2000" dirty="0">
+                <a:solidFill>
+                  <a:srgbClr val="383DBA"/>
+                </a:solidFill>
+                <a:latin typeface="Lato" panose="020B0604020202020204" charset="0"/>
+                <a:ea typeface="ヒラギノ角ゴ Pro W3" pitchFamily="-105" charset="-128"/>
+                <a:cs typeface="Courier New" panose="02070309020205020404" pitchFamily="49" charset="0"/>
+              </a:rPr>
+              <a:t>INOUT</a:t>
+            </a:r>
+            <a:r>
+              <a:rPr lang="en-US" altLang="en-US" sz="2000" dirty="0">
+                <a:latin typeface="Lato" panose="020B0604020202020204" charset="0"/>
+                <a:cs typeface="Courier New" panose="02070309020205020404" pitchFamily="49" charset="0"/>
+              </a:rPr>
+              <a:t> </a:t>
+            </a:r>
+            <a:r>
+              <a:rPr lang="en-US" altLang="en-US" sz="2000" dirty="0" err="1">
+                <a:solidFill>
+                  <a:srgbClr val="555555"/>
+                </a:solidFill>
+                <a:latin typeface="Lato" panose="020B0604020202020204" charset="0"/>
+                <a:cs typeface="Courier New" panose="02070309020205020404" pitchFamily="49" charset="0"/>
+              </a:rPr>
+              <a:t>variable_name</a:t>
+            </a:r>
+            <a:r>
+              <a:rPr lang="en-US" altLang="en-US" sz="2000" dirty="0">
+                <a:solidFill>
+                  <a:srgbClr val="555555"/>
+                </a:solidFill>
+                <a:latin typeface="Lato" panose="020B0604020202020204" charset="0"/>
+                <a:cs typeface="Courier New" panose="02070309020205020404" pitchFamily="49" charset="0"/>
+              </a:rPr>
+              <a:t> </a:t>
+            </a:r>
+            <a:r>
+              <a:rPr lang="en-US" altLang="en-US" sz="2000" dirty="0" err="1">
+                <a:solidFill>
+                  <a:srgbClr val="383DBA"/>
+                </a:solidFill>
+                <a:latin typeface="Lato" panose="020B0604020202020204" charset="0"/>
+                <a:ea typeface="ヒラギノ角ゴ Pro W3" pitchFamily="-105" charset="-128"/>
+                <a:cs typeface="Courier New" panose="02070309020205020404" pitchFamily="49" charset="0"/>
+              </a:rPr>
+              <a:t>data_type</a:t>
+            </a:r>
+            <a:r>
+              <a:rPr lang="en-US" altLang="en-US" sz="2000" dirty="0">
+                <a:solidFill>
+                  <a:srgbClr val="555555"/>
+                </a:solidFill>
+                <a:latin typeface="Lato" panose="020B0604020202020204" charset="0"/>
+                <a:cs typeface="Courier New" panose="02070309020205020404" pitchFamily="49" charset="0"/>
+              </a:rPr>
+              <a:t>, ...)</a:t>
+            </a:r>
+          </a:p>
+          <a:p>
+            <a:pPr>
+              <a:lnSpc>
+                <a:spcPct val="120000"/>
+              </a:lnSpc>
+            </a:pPr>
+            <a:r>
+              <a:rPr lang="en-US" altLang="en-US" sz="2000" dirty="0">
+                <a:solidFill>
+                  <a:srgbClr val="383DBA"/>
+                </a:solidFill>
+                <a:latin typeface="Lato" panose="020B0604020202020204" charset="0"/>
+                <a:ea typeface="ヒラギノ角ゴ Pro W3" pitchFamily="-105" charset="-128"/>
+                <a:cs typeface="Courier New" panose="02070309020205020404" pitchFamily="49" charset="0"/>
+              </a:rPr>
+              <a:t>BEGIN</a:t>
+            </a:r>
+            <a:r>
+              <a:rPr lang="en-US" altLang="en-US" sz="2000" dirty="0">
+                <a:latin typeface="Lato" panose="020B0604020202020204" charset="0"/>
+                <a:cs typeface="Courier New" panose="02070309020205020404" pitchFamily="49" charset="0"/>
+              </a:rPr>
+              <a:t> </a:t>
+            </a:r>
+          </a:p>
+          <a:p>
+            <a:pPr>
+              <a:lnSpc>
+                <a:spcPct val="120000"/>
+              </a:lnSpc>
+            </a:pPr>
+            <a:r>
+              <a:rPr lang="en-US" altLang="en-US" sz="2000" dirty="0">
+                <a:latin typeface="Lato" panose="020B0604020202020204" charset="0"/>
+                <a:cs typeface="Courier New" panose="02070309020205020404" pitchFamily="49" charset="0"/>
+              </a:rPr>
+              <a:t>  </a:t>
+            </a:r>
+            <a:r>
+              <a:rPr lang="en-US" altLang="en-US" sz="2000" dirty="0">
+                <a:solidFill>
+                  <a:srgbClr val="383DBA"/>
+                </a:solidFill>
+                <a:latin typeface="Lato" panose="020B0604020202020204" charset="0"/>
+                <a:ea typeface="ヒラギノ角ゴ Pro W3" pitchFamily="-105" charset="-128"/>
+                <a:cs typeface="Courier New" panose="02070309020205020404" pitchFamily="49" charset="0"/>
+              </a:rPr>
+              <a:t>DECLARE</a:t>
+            </a:r>
+            <a:r>
+              <a:rPr lang="en-US" altLang="en-US" sz="2000" dirty="0">
+                <a:latin typeface="Lato" panose="020B0604020202020204" charset="0"/>
+                <a:cs typeface="Courier New" panose="02070309020205020404" pitchFamily="49" charset="0"/>
+              </a:rPr>
+              <a:t> </a:t>
+            </a:r>
+            <a:r>
+              <a:rPr lang="en-US" altLang="en-US" sz="2000" dirty="0" err="1">
+                <a:solidFill>
+                  <a:srgbClr val="555555"/>
+                </a:solidFill>
+                <a:latin typeface="Lato" panose="020B0604020202020204" charset="0"/>
+                <a:cs typeface="Courier New" panose="02070309020205020404" pitchFamily="49" charset="0"/>
+              </a:rPr>
+              <a:t>variables|cursors|constants</a:t>
+            </a:r>
+            <a:r>
+              <a:rPr lang="en-US" altLang="en-US" sz="2000" dirty="0">
+                <a:solidFill>
+                  <a:srgbClr val="555555"/>
+                </a:solidFill>
+                <a:latin typeface="Lato" panose="020B0604020202020204" charset="0"/>
+                <a:cs typeface="Courier New" panose="02070309020205020404" pitchFamily="49" charset="0"/>
+              </a:rPr>
+              <a:t>;</a:t>
+            </a:r>
+          </a:p>
+          <a:p>
+            <a:pPr>
+              <a:lnSpc>
+                <a:spcPct val="120000"/>
+              </a:lnSpc>
+            </a:pPr>
+            <a:r>
+              <a:rPr lang="en-US" altLang="en-US" sz="2000" dirty="0">
+                <a:latin typeface="Lato" panose="020B0604020202020204" charset="0"/>
+                <a:cs typeface="Courier New" panose="02070309020205020404" pitchFamily="49" charset="0"/>
+              </a:rPr>
+              <a:t>  </a:t>
+            </a:r>
+            <a:r>
+              <a:rPr lang="en-US" altLang="en-US" sz="2000" dirty="0">
+                <a:solidFill>
+                  <a:srgbClr val="555555"/>
+                </a:solidFill>
+                <a:latin typeface="Lato" panose="020B0604020202020204" charset="0"/>
+                <a:cs typeface="Courier New" panose="02070309020205020404" pitchFamily="49" charset="0"/>
+              </a:rPr>
+              <a:t>... Add SQL code here</a:t>
+            </a:r>
+          </a:p>
+          <a:p>
+            <a:pPr>
+              <a:lnSpc>
+                <a:spcPct val="120000"/>
+              </a:lnSpc>
+            </a:pPr>
+            <a:r>
+              <a:rPr lang="en-US" altLang="en-US" sz="2000" dirty="0">
+                <a:solidFill>
+                  <a:srgbClr val="383DBA"/>
+                </a:solidFill>
+                <a:latin typeface="Lato" panose="020B0604020202020204" charset="0"/>
+                <a:ea typeface="ヒラギノ角ゴ Pro W3" pitchFamily="-105" charset="-128"/>
+                <a:cs typeface="Courier New" panose="02070309020205020404" pitchFamily="49" charset="0"/>
+              </a:rPr>
+              <a:t>END</a:t>
+            </a:r>
+            <a:r>
+              <a:rPr lang="en-US" altLang="en-US" sz="2000" dirty="0">
+                <a:solidFill>
+                  <a:srgbClr val="555555"/>
+                </a:solidFill>
+                <a:latin typeface="Lato" panose="020B0604020202020204" charset="0"/>
+                <a:cs typeface="Courier New" panose="02070309020205020404" pitchFamily="49" charset="0"/>
+              </a:rPr>
+              <a:t>$$</a:t>
+            </a:r>
+          </a:p>
+          <a:p>
+            <a:pPr>
+              <a:lnSpc>
+                <a:spcPct val="120000"/>
+              </a:lnSpc>
+            </a:pPr>
+            <a:r>
+              <a:rPr lang="en-US" sz="2000" dirty="0">
+                <a:solidFill>
+                  <a:srgbClr val="383DBA"/>
+                </a:solidFill>
+                <a:latin typeface="Lato" panose="020B0604020202020204" charset="0"/>
+                <a:ea typeface="ヒラギノ角ゴ Pro W3" pitchFamily="-105" charset="-128"/>
+                <a:cs typeface="Courier New" panose="02070309020205020404" pitchFamily="49" charset="0"/>
+              </a:rPr>
+              <a:t>DELIMITER</a:t>
+            </a:r>
+            <a:r>
+              <a:rPr lang="en-US" sz="2000" dirty="0">
+                <a:solidFill>
+                  <a:srgbClr val="555555"/>
+                </a:solidFill>
+                <a:latin typeface="Lato" panose="020B0604020202020204" charset="0"/>
+                <a:cs typeface="Courier New" panose="02070309020205020404" pitchFamily="49" charset="0"/>
+              </a:rPr>
+              <a:t> ;</a:t>
+            </a:r>
+            <a:endParaRPr lang="en-US" altLang="en-US" sz="2000" dirty="0">
+              <a:solidFill>
+                <a:srgbClr val="555555"/>
+              </a:solidFill>
+              <a:latin typeface="Lato" panose="020B0604020202020204" charset="0"/>
+              <a:cs typeface="Courier New" panose="02070309020205020404" pitchFamily="49" charset="0"/>
+            </a:endParaRPr>
+          </a:p>
+          <a:p>
+            <a:pPr>
+              <a:lnSpc>
+                <a:spcPct val="120000"/>
+              </a:lnSpc>
+            </a:pPr>
+            <a:endParaRPr lang="en-US" sz="2000" dirty="0">
+              <a:latin typeface="Lato" panose="020B0604020202020204" charset="0"/>
+              <a:cs typeface="Courier New" panose="02070309020205020404" pitchFamily="49" charset="0"/>
+            </a:endParaRPr>
+          </a:p>
+          <a:p>
+            <a:pPr>
+              <a:lnSpc>
+                <a:spcPct val="120000"/>
+              </a:lnSpc>
+            </a:pPr>
+            <a:r>
+              <a:rPr lang="en-US" altLang="en-US" sz="2000" dirty="0">
+                <a:latin typeface="Lato" panose="020B0604020202020204" charset="0"/>
+              </a:rPr>
+              <a:t>Call the procedure: </a:t>
+            </a:r>
+          </a:p>
+          <a:p>
+            <a:pPr>
+              <a:lnSpc>
+                <a:spcPct val="120000"/>
+              </a:lnSpc>
+            </a:pPr>
+            <a:r>
+              <a:rPr lang="en-US" sz="2000" dirty="0">
+                <a:solidFill>
+                  <a:srgbClr val="383DBA"/>
+                </a:solidFill>
+                <a:latin typeface="Lato" panose="020B0604020202020204" charset="0"/>
+                <a:ea typeface="ヒラギノ角ゴ Pro W3" pitchFamily="-105" charset="-128"/>
+                <a:cs typeface="Courier New" panose="02070309020205020404" pitchFamily="49" charset="0"/>
+              </a:rPr>
+              <a:t>CALL</a:t>
+            </a:r>
+            <a:r>
+              <a:rPr lang="en-US" altLang="en-US" sz="2000" dirty="0">
+                <a:latin typeface="Lato" panose="020B0604020202020204" charset="0"/>
+                <a:cs typeface="Courier New" panose="02070309020205020404" pitchFamily="49" charset="0"/>
+              </a:rPr>
+              <a:t> </a:t>
+            </a:r>
+            <a:r>
+              <a:rPr lang="en-US" altLang="en-US" sz="2000" dirty="0" err="1">
+                <a:solidFill>
+                  <a:srgbClr val="555555"/>
+                </a:solidFill>
+                <a:latin typeface="Lato" panose="020B0604020202020204" charset="0"/>
+                <a:cs typeface="Courier New" panose="02070309020205020404" pitchFamily="49" charset="0"/>
+              </a:rPr>
+              <a:t>procedure_name</a:t>
+            </a:r>
+            <a:r>
+              <a:rPr lang="en-US" altLang="en-US" sz="2000" dirty="0">
+                <a:solidFill>
+                  <a:srgbClr val="555555"/>
+                </a:solidFill>
+                <a:latin typeface="Lato" panose="020B0604020202020204" charset="0"/>
+                <a:cs typeface="Courier New" panose="02070309020205020404" pitchFamily="49" charset="0"/>
+              </a:rPr>
+              <a:t>(variable1, variable2, ...);</a:t>
+            </a:r>
+            <a:endParaRPr lang="en-US" sz="2000" dirty="0">
+              <a:latin typeface="Lato" panose="020B0604020202020204" charset="0"/>
+            </a:endParaRPr>
+          </a:p>
+        </p:txBody>
+      </p:sp>
+    </p:spTree>
+    <p:extLst>
+      <p:ext uri="{BB962C8B-B14F-4D97-AF65-F5344CB8AC3E}">
+        <p14:creationId xmlns:p14="http://schemas.microsoft.com/office/powerpoint/2010/main" val="1042471324"/>
+      </p:ext>
+    </p:extLst>
+  </p:cSld>
+  <p:clrMapOvr>
+    <a:masterClrMapping/>
+  </p:clrMapOvr>
+</p:sld>
+</file>
+
+<file path=ppt/slides/slide14.xml><?xml version="1.0" encoding="utf-8"?>
+<p:sld xmlns:a="http://schemas.openxmlformats.org/drawingml/2006/main" xmlns:r="http://schemas.openxmlformats.org/officeDocument/2006/relationships" xmlns:p="http://schemas.openxmlformats.org/presentationml/2006/main">
+  <p:cSld>
+    <p:spTree>
+      <p:nvGrpSpPr>
+        <p:cNvPr id="1" name="Shape 281"/>
+        <p:cNvGrpSpPr/>
+        <p:nvPr/>
+      </p:nvGrpSpPr>
+      <p:grpSpPr>
+        <a:xfrm>
+          <a:off x="0" y="0"/>
+          <a:ext cx="0" cy="0"/>
+          <a:chOff x="0" y="0"/>
+          <a:chExt cx="0" cy="0"/>
+        </a:xfrm>
+      </p:grpSpPr>
+      <p:sp>
+        <p:nvSpPr>
+          <p:cNvPr id="282" name="Google Shape;282;p40"/>
+          <p:cNvSpPr txBox="1">
+            <a:spLocks noGrp="1"/>
+          </p:cNvSpPr>
+          <p:nvPr>
+            <p:ph type="ctrTitle"/>
+          </p:nvPr>
+        </p:nvSpPr>
+        <p:spPr>
+          <a:xfrm>
+            <a:off x="972825" y="697317"/>
+            <a:ext cx="10250700" cy="2219700"/>
+          </a:xfrm>
+          <a:prstGeom prst="rect">
+            <a:avLst/>
+          </a:prstGeom>
+        </p:spPr>
+        <p:txBody>
+          <a:bodyPr spcFirstLastPara="1" wrap="square" lIns="121900" tIns="121900" rIns="121900" bIns="121900" anchor="t" anchorCtr="0">
+            <a:noAutofit/>
+          </a:bodyPr>
+          <a:lstStyle/>
+          <a:p>
+            <a:pPr marL="0" lvl="0" indent="0" algn="l" rtl="0">
+              <a:spcBef>
+                <a:spcPts val="0"/>
+              </a:spcBef>
+              <a:spcAft>
+                <a:spcPts val="0"/>
+              </a:spcAft>
+              <a:buNone/>
+            </a:pPr>
+            <a:r>
+              <a:rPr lang="en-US" sz="4800" dirty="0"/>
+              <a:t>Appendix B – Functions</a:t>
+            </a:r>
+            <a:endParaRPr sz="4800" dirty="0"/>
+          </a:p>
+        </p:txBody>
+      </p:sp>
+      <p:sp>
+        <p:nvSpPr>
+          <p:cNvPr id="2" name="Rectangle 1">
+            <a:extLst>
+              <a:ext uri="{FF2B5EF4-FFF2-40B4-BE49-F238E27FC236}">
+                <a16:creationId xmlns:a16="http://schemas.microsoft.com/office/drawing/2014/main" id="{BCB4BAF3-50DB-4C6B-8297-FDD3A9D2D227}"/>
+              </a:ext>
+            </a:extLst>
+          </p:cNvPr>
+          <p:cNvSpPr/>
+          <p:nvPr/>
+        </p:nvSpPr>
+        <p:spPr>
+          <a:xfrm>
+            <a:off x="360608" y="1807167"/>
+            <a:ext cx="11552350" cy="4855945"/>
+          </a:xfrm>
+          <a:prstGeom prst="rect">
+            <a:avLst/>
+          </a:prstGeom>
+        </p:spPr>
+        <p:txBody>
+          <a:bodyPr wrap="square">
+            <a:spAutoFit/>
+          </a:bodyPr>
+          <a:lstStyle/>
+          <a:p>
+            <a:pPr>
+              <a:lnSpc>
+                <a:spcPct val="120000"/>
+              </a:lnSpc>
+            </a:pPr>
+            <a:r>
+              <a:rPr lang="en-US" altLang="en-US" sz="2000" b="1" dirty="0">
+                <a:latin typeface="Lato" panose="020B0604020202020204" charset="0"/>
+              </a:rPr>
+              <a:t>Definition:</a:t>
+            </a:r>
+            <a:r>
+              <a:rPr lang="en-US" altLang="en-US" sz="2000" dirty="0">
+                <a:latin typeface="Lato" panose="020B0604020202020204" charset="0"/>
+              </a:rPr>
+              <a:t> routines that return values (usually in select statement) and may take input parameters, called explicitly.</a:t>
+            </a:r>
+          </a:p>
+          <a:p>
+            <a:pPr>
+              <a:lnSpc>
+                <a:spcPct val="120000"/>
+              </a:lnSpc>
+            </a:pPr>
+            <a:endParaRPr lang="en-US" altLang="en-US" sz="2000" dirty="0">
+              <a:latin typeface="Lato" panose="020B0604020202020204" charset="0"/>
+            </a:endParaRPr>
+          </a:p>
+          <a:p>
+            <a:pPr>
+              <a:lnSpc>
+                <a:spcPct val="120000"/>
+              </a:lnSpc>
+            </a:pPr>
+            <a:r>
+              <a:rPr lang="en-US" altLang="en-US" sz="2000" dirty="0">
+                <a:solidFill>
+                  <a:srgbClr val="383DBA"/>
+                </a:solidFill>
+                <a:latin typeface="Lato" panose="020B0604020202020204" charset="0"/>
+                <a:ea typeface="ヒラギノ角ゴ Pro W3" pitchFamily="-105" charset="-128"/>
+                <a:cs typeface="Courier New" panose="02070309020205020404" pitchFamily="49" charset="0"/>
+              </a:rPr>
+              <a:t>CREATE</a:t>
+            </a:r>
+            <a:r>
+              <a:rPr lang="en-US" altLang="en-US" sz="2000" dirty="0">
+                <a:latin typeface="Lato" panose="020B0604020202020204" charset="0"/>
+                <a:cs typeface="Courier New" panose="02070309020205020404" pitchFamily="49" charset="0"/>
+              </a:rPr>
+              <a:t> </a:t>
+            </a:r>
+            <a:r>
+              <a:rPr lang="en-US" altLang="en-US" sz="2000" dirty="0">
+                <a:solidFill>
+                  <a:srgbClr val="383DBA"/>
+                </a:solidFill>
+                <a:latin typeface="Lato" panose="020B0604020202020204" charset="0"/>
+                <a:ea typeface="ヒラギノ角ゴ Pro W3" pitchFamily="-105" charset="-128"/>
+                <a:cs typeface="Courier New" panose="02070309020205020404" pitchFamily="49" charset="0"/>
+              </a:rPr>
+              <a:t>FUNCTION</a:t>
+            </a:r>
+            <a:r>
+              <a:rPr lang="en-US" altLang="en-US" sz="2000" dirty="0">
+                <a:solidFill>
+                  <a:srgbClr val="555555"/>
+                </a:solidFill>
+                <a:latin typeface="Lato" panose="020B0604020202020204" charset="0"/>
+                <a:cs typeface="Courier New" panose="02070309020205020404" pitchFamily="49" charset="0"/>
+              </a:rPr>
+              <a:t> </a:t>
+            </a:r>
+            <a:r>
+              <a:rPr lang="en-US" altLang="en-US" sz="2000" dirty="0" err="1">
+                <a:solidFill>
+                  <a:srgbClr val="555555"/>
+                </a:solidFill>
+                <a:latin typeface="Lato" panose="020B0604020202020204" charset="0"/>
+                <a:cs typeface="Courier New" panose="02070309020205020404" pitchFamily="49" charset="0"/>
+              </a:rPr>
+              <a:t>function_name</a:t>
+            </a:r>
+            <a:r>
+              <a:rPr lang="en-US" altLang="en-US" sz="2000" dirty="0">
+                <a:solidFill>
+                  <a:srgbClr val="555555"/>
+                </a:solidFill>
+                <a:latin typeface="Lato" panose="020B0604020202020204" charset="0"/>
+                <a:cs typeface="Courier New" panose="02070309020205020404" pitchFamily="49" charset="0"/>
+              </a:rPr>
+              <a:t>(</a:t>
+            </a:r>
+            <a:r>
+              <a:rPr lang="en-US" altLang="en-US" sz="2000" dirty="0" err="1">
+                <a:solidFill>
+                  <a:srgbClr val="555555"/>
+                </a:solidFill>
+                <a:latin typeface="Lato" panose="020B0604020202020204" charset="0"/>
+                <a:cs typeface="Courier New" panose="02070309020205020404" pitchFamily="49" charset="0"/>
+              </a:rPr>
+              <a:t>variable_name</a:t>
+            </a:r>
+            <a:r>
+              <a:rPr lang="en-US" altLang="en-US" sz="2000" dirty="0">
+                <a:solidFill>
+                  <a:srgbClr val="555555"/>
+                </a:solidFill>
+                <a:latin typeface="Lato" panose="020B0604020202020204" charset="0"/>
+                <a:cs typeface="Courier New" panose="02070309020205020404" pitchFamily="49" charset="0"/>
+              </a:rPr>
+              <a:t> </a:t>
+            </a:r>
+            <a:r>
+              <a:rPr lang="en-US" altLang="en-US" sz="2000" dirty="0" err="1">
+                <a:solidFill>
+                  <a:srgbClr val="383DBA"/>
+                </a:solidFill>
+                <a:latin typeface="Lato" panose="020B0604020202020204" charset="0"/>
+                <a:ea typeface="ヒラギノ角ゴ Pro W3" pitchFamily="-105" charset="-128"/>
+                <a:cs typeface="Courier New" panose="02070309020205020404" pitchFamily="49" charset="0"/>
+              </a:rPr>
+              <a:t>data_type</a:t>
+            </a:r>
+            <a:r>
+              <a:rPr lang="en-US" altLang="en-US" sz="2000" dirty="0">
+                <a:solidFill>
+                  <a:srgbClr val="555555"/>
+                </a:solidFill>
+                <a:latin typeface="Lato" panose="020B0604020202020204" charset="0"/>
+                <a:cs typeface="Courier New" panose="02070309020205020404" pitchFamily="49" charset="0"/>
+              </a:rPr>
+              <a:t>, ...) </a:t>
+            </a:r>
+            <a:r>
+              <a:rPr lang="en-US" altLang="en-US" sz="2000" dirty="0">
+                <a:solidFill>
+                  <a:srgbClr val="383DBA"/>
+                </a:solidFill>
+                <a:latin typeface="Lato" panose="020B0604020202020204" charset="0"/>
+                <a:ea typeface="ヒラギノ角ゴ Pro W3" pitchFamily="-105" charset="-128"/>
+                <a:cs typeface="Courier New" panose="02070309020205020404" pitchFamily="49" charset="0"/>
+              </a:rPr>
+              <a:t>RETURNS</a:t>
+            </a:r>
+            <a:r>
+              <a:rPr lang="en-US" altLang="en-US" sz="2000" dirty="0">
+                <a:latin typeface="Lato" panose="020B0604020202020204" charset="0"/>
+                <a:cs typeface="Courier New" panose="02070309020205020404" pitchFamily="49" charset="0"/>
+              </a:rPr>
+              <a:t> </a:t>
+            </a:r>
+            <a:r>
+              <a:rPr lang="en-US" altLang="en-US" sz="2000" dirty="0" err="1">
+                <a:solidFill>
+                  <a:srgbClr val="383DBA"/>
+                </a:solidFill>
+                <a:latin typeface="Lato" panose="020B0604020202020204" charset="0"/>
+                <a:ea typeface="ヒラギノ角ゴ Pro W3" pitchFamily="-105" charset="-128"/>
+                <a:cs typeface="Courier New" panose="02070309020205020404" pitchFamily="49" charset="0"/>
+              </a:rPr>
+              <a:t>data_type</a:t>
+            </a:r>
+            <a:endParaRPr lang="en-US" altLang="en-US" sz="2000" dirty="0">
+              <a:solidFill>
+                <a:srgbClr val="383DBA"/>
+              </a:solidFill>
+              <a:latin typeface="Lato" panose="020B0604020202020204" charset="0"/>
+              <a:ea typeface="ヒラギノ角ゴ Pro W3" pitchFamily="-105" charset="-128"/>
+              <a:cs typeface="Courier New" panose="02070309020205020404" pitchFamily="49" charset="0"/>
+            </a:endParaRPr>
+          </a:p>
+          <a:p>
+            <a:pPr>
+              <a:lnSpc>
+                <a:spcPct val="120000"/>
+              </a:lnSpc>
+            </a:pPr>
+            <a:r>
+              <a:rPr lang="en-US" altLang="en-US" sz="2000" dirty="0">
+                <a:solidFill>
+                  <a:srgbClr val="383DBA"/>
+                </a:solidFill>
+                <a:latin typeface="Lato" panose="020B0604020202020204" charset="0"/>
+                <a:ea typeface="ヒラギノ角ゴ Pro W3" pitchFamily="-105" charset="-128"/>
+                <a:cs typeface="Courier New" panose="02070309020205020404" pitchFamily="49" charset="0"/>
+              </a:rPr>
+              <a:t>BEGIN</a:t>
+            </a:r>
+          </a:p>
+          <a:p>
+            <a:pPr>
+              <a:lnSpc>
+                <a:spcPct val="120000"/>
+              </a:lnSpc>
+            </a:pPr>
+            <a:r>
+              <a:rPr lang="en-US" altLang="en-US" sz="2000" dirty="0">
+                <a:latin typeface="Lato" panose="020B0604020202020204" charset="0"/>
+                <a:cs typeface="Courier New" panose="02070309020205020404" pitchFamily="49" charset="0"/>
+              </a:rPr>
+              <a:t>  </a:t>
+            </a:r>
+            <a:r>
+              <a:rPr lang="en-US" altLang="en-US" sz="2000" dirty="0">
+                <a:solidFill>
+                  <a:srgbClr val="383DBA"/>
+                </a:solidFill>
+                <a:latin typeface="Lato" panose="020B0604020202020204" charset="0"/>
+                <a:ea typeface="ヒラギノ角ゴ Pro W3" pitchFamily="-105" charset="-128"/>
+                <a:cs typeface="Courier New" panose="02070309020205020404" pitchFamily="49" charset="0"/>
+              </a:rPr>
+              <a:t>DECLARE</a:t>
+            </a:r>
+            <a:r>
+              <a:rPr lang="en-US" altLang="en-US" sz="2000" dirty="0">
+                <a:latin typeface="Lato" panose="020B0604020202020204" charset="0"/>
+                <a:cs typeface="Courier New" panose="02070309020205020404" pitchFamily="49" charset="0"/>
+              </a:rPr>
+              <a:t> </a:t>
+            </a:r>
+            <a:r>
+              <a:rPr lang="en-US" altLang="en-US" sz="2000" dirty="0" err="1">
+                <a:solidFill>
+                  <a:srgbClr val="555555"/>
+                </a:solidFill>
+                <a:latin typeface="Lato" panose="020B0604020202020204" charset="0"/>
+                <a:cs typeface="Courier New" panose="02070309020205020404" pitchFamily="49" charset="0"/>
+              </a:rPr>
+              <a:t>variables|cursors|constants</a:t>
+            </a:r>
+            <a:r>
+              <a:rPr lang="en-US" altLang="en-US" sz="2000" dirty="0">
+                <a:solidFill>
+                  <a:srgbClr val="555555"/>
+                </a:solidFill>
+                <a:latin typeface="Lato" panose="020B0604020202020204" charset="0"/>
+                <a:cs typeface="Courier New" panose="02070309020205020404" pitchFamily="49" charset="0"/>
+              </a:rPr>
+              <a:t>;</a:t>
+            </a:r>
+          </a:p>
+          <a:p>
+            <a:pPr>
+              <a:lnSpc>
+                <a:spcPct val="120000"/>
+              </a:lnSpc>
+            </a:pPr>
+            <a:r>
+              <a:rPr lang="en-US" altLang="en-US" sz="2000" dirty="0">
+                <a:solidFill>
+                  <a:srgbClr val="555555"/>
+                </a:solidFill>
+                <a:latin typeface="Lato" panose="020B0604020202020204" charset="0"/>
+                <a:cs typeface="Courier New" panose="02070309020205020404" pitchFamily="49" charset="0"/>
+              </a:rPr>
+              <a:t>  ... Insert your code here</a:t>
+            </a:r>
+          </a:p>
+          <a:p>
+            <a:pPr>
+              <a:lnSpc>
+                <a:spcPct val="120000"/>
+              </a:lnSpc>
+            </a:pPr>
+            <a:r>
+              <a:rPr lang="en-US" altLang="en-US" sz="2000" dirty="0">
+                <a:latin typeface="Lato" panose="020B0604020202020204" charset="0"/>
+                <a:cs typeface="Courier New" panose="02070309020205020404" pitchFamily="49" charset="0"/>
+              </a:rPr>
+              <a:t>  </a:t>
+            </a:r>
+            <a:r>
+              <a:rPr lang="en-US" altLang="en-US" sz="2000" dirty="0">
+                <a:solidFill>
+                  <a:srgbClr val="383DBA"/>
+                </a:solidFill>
+                <a:latin typeface="Lato" panose="020B0604020202020204" charset="0"/>
+                <a:ea typeface="ヒラギノ角ゴ Pro W3" pitchFamily="-105" charset="-128"/>
+                <a:cs typeface="Courier New" panose="02070309020205020404" pitchFamily="49" charset="0"/>
+              </a:rPr>
+              <a:t>RETURN</a:t>
+            </a:r>
+            <a:r>
+              <a:rPr lang="en-US" altLang="en-US" sz="2000" dirty="0">
+                <a:solidFill>
+                  <a:srgbClr val="555555"/>
+                </a:solidFill>
+                <a:latin typeface="Lato" panose="020B0604020202020204" charset="0"/>
+                <a:cs typeface="Courier New" panose="02070309020205020404" pitchFamily="49" charset="0"/>
+              </a:rPr>
+              <a:t> (variable);</a:t>
+            </a:r>
+          </a:p>
+          <a:p>
+            <a:pPr>
+              <a:lnSpc>
+                <a:spcPct val="120000"/>
+              </a:lnSpc>
+            </a:pPr>
+            <a:r>
+              <a:rPr lang="en-US" altLang="en-US" sz="2000" dirty="0">
+                <a:solidFill>
+                  <a:srgbClr val="383DBA"/>
+                </a:solidFill>
+                <a:latin typeface="Lato" panose="020B0604020202020204" charset="0"/>
+                <a:ea typeface="ヒラギノ角ゴ Pro W3" pitchFamily="-105" charset="-128"/>
+                <a:cs typeface="Courier New" panose="02070309020205020404" pitchFamily="49" charset="0"/>
+              </a:rPr>
+              <a:t>END</a:t>
+            </a:r>
+            <a:r>
+              <a:rPr lang="en-US" altLang="en-US" sz="2000" dirty="0">
+                <a:solidFill>
+                  <a:srgbClr val="555555"/>
+                </a:solidFill>
+                <a:latin typeface="Lato" panose="020B0604020202020204" charset="0"/>
+                <a:cs typeface="Courier New" panose="02070309020205020404" pitchFamily="49" charset="0"/>
+              </a:rPr>
+              <a:t>$$</a:t>
+            </a:r>
+          </a:p>
+          <a:p>
+            <a:pPr>
+              <a:lnSpc>
+                <a:spcPct val="120000"/>
+              </a:lnSpc>
+            </a:pPr>
+            <a:r>
+              <a:rPr lang="en-US" sz="2000" dirty="0">
+                <a:solidFill>
+                  <a:srgbClr val="383DBA"/>
+                </a:solidFill>
+                <a:latin typeface="Lato" panose="020B0604020202020204" charset="0"/>
+                <a:ea typeface="ヒラギノ角ゴ Pro W3" pitchFamily="-105" charset="-128"/>
+                <a:cs typeface="Courier New" panose="02070309020205020404" pitchFamily="49" charset="0"/>
+              </a:rPr>
+              <a:t>DELIMITER</a:t>
+            </a:r>
+            <a:r>
+              <a:rPr lang="en-US" sz="2000" dirty="0">
+                <a:solidFill>
+                  <a:srgbClr val="555555"/>
+                </a:solidFill>
+                <a:latin typeface="Lato" panose="020B0604020202020204" charset="0"/>
+                <a:cs typeface="Courier New" panose="02070309020205020404" pitchFamily="49" charset="0"/>
+              </a:rPr>
+              <a:t> ;</a:t>
+            </a:r>
+            <a:endParaRPr lang="en-US" altLang="en-US" sz="2000" dirty="0">
+              <a:solidFill>
+                <a:srgbClr val="555555"/>
+              </a:solidFill>
+              <a:latin typeface="Lato" panose="020B0604020202020204" charset="0"/>
+              <a:cs typeface="Courier New" panose="02070309020205020404" pitchFamily="49" charset="0"/>
+            </a:endParaRPr>
+          </a:p>
+          <a:p>
+            <a:pPr>
+              <a:lnSpc>
+                <a:spcPct val="120000"/>
+              </a:lnSpc>
+            </a:pPr>
+            <a:endParaRPr lang="en-US" sz="2000" dirty="0">
+              <a:latin typeface="Lato" panose="020B0604020202020204" charset="0"/>
+              <a:cs typeface="Courier New" panose="02070309020205020404" pitchFamily="49" charset="0"/>
+            </a:endParaRPr>
+          </a:p>
+          <a:p>
+            <a:pPr>
+              <a:lnSpc>
+                <a:spcPct val="120000"/>
+              </a:lnSpc>
+            </a:pPr>
+            <a:r>
+              <a:rPr lang="en-US" altLang="en-US" sz="2000" dirty="0">
+                <a:latin typeface="Lato" panose="020B0604020202020204" charset="0"/>
+              </a:rPr>
+              <a:t>Call the function:</a:t>
+            </a:r>
+            <a:r>
+              <a:rPr lang="en-US" altLang="en-US" sz="2000" i="1" dirty="0">
+                <a:latin typeface="Lato" panose="020B0604020202020204" charset="0"/>
+              </a:rPr>
+              <a:t> </a:t>
+            </a:r>
+          </a:p>
+          <a:p>
+            <a:pPr>
+              <a:lnSpc>
+                <a:spcPct val="120000"/>
+              </a:lnSpc>
+            </a:pPr>
+            <a:r>
+              <a:rPr lang="en-US" sz="2000" dirty="0">
+                <a:solidFill>
+                  <a:srgbClr val="383DBA"/>
+                </a:solidFill>
+                <a:latin typeface="Lato" panose="020B0604020202020204" charset="0"/>
+                <a:ea typeface="ヒラギノ角ゴ Pro W3" pitchFamily="-105" charset="-128"/>
+                <a:cs typeface="Courier New" panose="02070309020205020404" pitchFamily="49" charset="0"/>
+              </a:rPr>
+              <a:t>SELECT</a:t>
+            </a:r>
+            <a:r>
+              <a:rPr lang="en-US" sz="2000" dirty="0">
+                <a:latin typeface="Lato" panose="020B0604020202020204" charset="0"/>
+                <a:cs typeface="Courier New" panose="02070309020205020404" pitchFamily="49" charset="0"/>
+              </a:rPr>
+              <a:t> </a:t>
+            </a:r>
+            <a:r>
+              <a:rPr lang="en-US" sz="2000" dirty="0" err="1">
+                <a:solidFill>
+                  <a:srgbClr val="555555"/>
+                </a:solidFill>
+                <a:latin typeface="Lato" panose="020B0604020202020204" charset="0"/>
+                <a:cs typeface="Courier New" panose="02070309020205020404" pitchFamily="49" charset="0"/>
+              </a:rPr>
+              <a:t>function_name</a:t>
+            </a:r>
+            <a:r>
+              <a:rPr lang="en-US" sz="2000" dirty="0">
+                <a:solidFill>
+                  <a:srgbClr val="555555"/>
+                </a:solidFill>
+                <a:latin typeface="Lato" panose="020B0604020202020204" charset="0"/>
+                <a:cs typeface="Courier New" panose="02070309020205020404" pitchFamily="49" charset="0"/>
+              </a:rPr>
+              <a:t>(variable</a:t>
+            </a:r>
+            <a:r>
+              <a:rPr lang="en-US" altLang="en-US" sz="2000" dirty="0">
+                <a:solidFill>
+                  <a:srgbClr val="555555"/>
+                </a:solidFill>
+                <a:latin typeface="Lato" panose="020B0604020202020204" charset="0"/>
+                <a:cs typeface="Courier New" panose="02070309020205020404" pitchFamily="49" charset="0"/>
+              </a:rPr>
+              <a:t>) </a:t>
+            </a:r>
+            <a:r>
+              <a:rPr lang="en-US" altLang="en-US" sz="2000" dirty="0">
+                <a:solidFill>
+                  <a:srgbClr val="383DBA"/>
+                </a:solidFill>
+                <a:latin typeface="Lato" panose="020B0604020202020204" charset="0"/>
+                <a:ea typeface="ヒラギノ角ゴ Pro W3" pitchFamily="-105" charset="-128"/>
+                <a:cs typeface="Courier New" panose="02070309020205020404" pitchFamily="49" charset="0"/>
+              </a:rPr>
+              <a:t>FROM DUAL</a:t>
+            </a:r>
+            <a:r>
+              <a:rPr lang="en-US" altLang="en-US" sz="2000" dirty="0">
+                <a:solidFill>
+                  <a:srgbClr val="555555"/>
+                </a:solidFill>
+                <a:latin typeface="Lato" panose="020B0604020202020204" charset="0"/>
+                <a:cs typeface="Courier New" panose="02070309020205020404" pitchFamily="49" charset="0"/>
+              </a:rPr>
+              <a:t>;</a:t>
+            </a:r>
+          </a:p>
+        </p:txBody>
+      </p:sp>
+    </p:spTree>
+    <p:extLst>
+      <p:ext uri="{BB962C8B-B14F-4D97-AF65-F5344CB8AC3E}">
+        <p14:creationId xmlns:p14="http://schemas.microsoft.com/office/powerpoint/2010/main" val="1464790433"/>
+      </p:ext>
+    </p:extLst>
   </p:cSld>
   <p:clrMapOvr>
     <a:masterClrMapping/>
@@ -16528,7 +17191,7 @@
                 <a:cs typeface="Lato"/>
                 <a:sym typeface="Lato"/>
               </a:rPr>
-              <a:t> INT(11) </a:t>
+              <a:t> INT </a:t>
             </a:r>
             <a:r>
               <a:rPr lang="en-US" b="1" dirty="0">
@@ -16880,7 +17543,7 @@
                 <a:cs typeface="Lato"/>
                 <a:sym typeface="Lato"/>
               </a:rPr>
-              <a:t>  state VARCHAR(50) </a:t>
+              <a:t>  state CHAR(2) </a:t>
             </a:r>
             <a:r>
               <a:rPr lang="en-US" b="1" dirty="0">
@@ -16892,7 +17555,7 @@
                 <a:cs typeface="Lato"/>
                 <a:sym typeface="Lato"/>
               </a:rPr>
-              <a:t>DEFAULT NULL,</a:t>
+              <a:t>DEFAULT ‘NE’,</a:t>
             </a:r>
             <a:br>
               <a:rPr lang="en-US" b="1" dirty="0">
@@ -16974,7 +17637,7 @@
                 <a:cs typeface="Lato"/>
                 <a:sym typeface="Lato"/>
               </a:rPr>
-              <a:t>  country VARCHAR(50) </a:t>
+              <a:t>  country CHAR(3)</a:t>
             </a:r>
             <a:r>
               <a:rPr lang="en-US" b="1" dirty="0">
@@ -16986,7 +17649,7 @@
                 <a:cs typeface="Lato"/>
                 <a:sym typeface="Lato"/>
               </a:rPr>
-              <a:t>NOT NULL,</a:t>
+              <a:t>NOT NULL DEFAULT 'USA', </a:t>
             </a:r>
             <a:br>
               <a:rPr lang="en-US" b="1" dirty="0">
@@ -17033,7 +17696,7 @@
                 <a:cs typeface="Lato"/>
                 <a:sym typeface="Lato"/>
               </a:rPr>
-              <a:t> INT(11) </a:t>
+              <a:t> INT </a:t>
             </a:r>
             <a:r>
               <a:rPr lang="en-US" b="1" dirty="0">
@@ -17104,7 +17767,31 @@
                 <a:cs typeface="Lato"/>
                 <a:sym typeface="Lato"/>
               </a:rPr>
-              <a:t>DEFAULT NULL,</a:t>
+              <a:t>CHECK (</a:t>
+            </a:r>
+            <a:r>
+              <a:rPr lang="en-US" b="1" dirty="0" err="1">
+                <a:solidFill>
+                  <a:srgbClr val="3D85C6"/>
+                </a:solidFill>
+                <a:latin typeface="Lato"/>
+                <a:ea typeface="Lato"/>
+                <a:cs typeface="Lato"/>
+                <a:sym typeface="Lato"/>
+              </a:rPr>
+              <a:t>creditlimit</a:t>
+            </a:r>
+            <a:r>
+              <a:rPr lang="en-US" b="1" dirty="0">
+                <a:solidFill>
+                  <a:srgbClr val="3D85C6"/>
+                </a:solidFill>
+                <a:latin typeface="Lato"/>
+                <a:ea typeface="Lato"/>
+                <a:cs typeface="Lato"/>
+                <a:sym typeface="Lato"/>
+              </a:rPr>
+              <a:t> &lt; 1000000), </a:t>
             </a:r>
             <a:br>
               <a:rPr lang="en-US" b="1" dirty="0">
@@ -17333,7 +18020,7 @@
               <a:buNone/>
             </a:pPr>
             <a:r>
-              <a:rPr lang="en-US" sz="1500" b="1" dirty="0" err="1">
+              <a:rPr lang="en-US" sz="1500" b="1" dirty="0">
                 <a:solidFill>
                   <a:srgbClr val="3D85C6"/>
                 </a:solidFill>
@@ -17342,7 +18029,7 @@
                 <a:cs typeface="Lato"/>
                 <a:sym typeface="Lato"/>
               </a:rPr>
-              <a:t>ConstraINTs</a:t>
+              <a:t>Constraints</a:t>
             </a:r>
             <a:endParaRPr sz="1500" b="1" dirty="0">
               <a:solidFill>
@@ -17601,7 +18288,7 @@
         </p:blipFill>
         <p:spPr>
           <a:xfrm>
-            <a:off x="7339397" y="2349437"/>
+            <a:off x="7468186" y="2349436"/>
             <a:ext cx="2774852" cy="3629464"/>
           </a:xfrm>
           <a:prstGeom prst="rect">

</xml_diff>